<commit_message>
cambios menores y ejercicio
</commit_message>
<xml_diff>
--- a/_18_JSF/powerpoint/JSF - 2 - Vistas.pptx
+++ b/_18_JSF/powerpoint/JSF - 2 - Vistas.pptx
@@ -513,7 +513,7 @@
               <a:pPr>
                 <a:defRPr/>
               </a:pPr>
-              <a:t>18/10/2022</a:t>
+              <a:t>28/10/2022</a:t>
             </a:fld>
             <a:endParaRPr lang="es-ES"/>
           </a:p>
@@ -703,7 +703,7 @@
               <a:pPr>
                 <a:defRPr/>
               </a:pPr>
-              <a:t>18/10/2022</a:t>
+              <a:t>28/10/2022</a:t>
             </a:fld>
             <a:endParaRPr lang="es-ES"/>
           </a:p>
@@ -903,7 +903,7 @@
               <a:pPr>
                 <a:defRPr/>
               </a:pPr>
-              <a:t>18/10/2022</a:t>
+              <a:t>28/10/2022</a:t>
             </a:fld>
             <a:endParaRPr lang="es-ES"/>
           </a:p>
@@ -3450,7 +3450,7 @@
               <a:pPr>
                 <a:defRPr/>
               </a:pPr>
-              <a:t>18/10/2022</a:t>
+              <a:t>28/10/2022</a:t>
             </a:fld>
             <a:endParaRPr lang="es-ES"/>
           </a:p>
@@ -4454,7 +4454,7 @@
               <a:pPr>
                 <a:defRPr/>
               </a:pPr>
-              <a:t>18/10/2022</a:t>
+              <a:t>28/10/2022</a:t>
             </a:fld>
             <a:endParaRPr lang="es-ES"/>
           </a:p>
@@ -4761,7 +4761,7 @@
               <a:pPr>
                 <a:defRPr/>
               </a:pPr>
-              <a:t>18/10/2022</a:t>
+              <a:t>28/10/2022</a:t>
             </a:fld>
             <a:endParaRPr lang="es-ES"/>
           </a:p>
@@ -5202,7 +5202,7 @@
               <a:pPr>
                 <a:defRPr/>
               </a:pPr>
-              <a:t>18/10/2022</a:t>
+              <a:t>28/10/2022</a:t>
             </a:fld>
             <a:endParaRPr lang="es-ES"/>
           </a:p>
@@ -5341,7 +5341,7 @@
               <a:pPr>
                 <a:defRPr/>
               </a:pPr>
-              <a:t>18/10/2022</a:t>
+              <a:t>28/10/2022</a:t>
             </a:fld>
             <a:endParaRPr lang="es-ES"/>
           </a:p>
@@ -5458,7 +5458,7 @@
               <a:pPr>
                 <a:defRPr/>
               </a:pPr>
-              <a:t>18/10/2022</a:t>
+              <a:t>28/10/2022</a:t>
             </a:fld>
             <a:endParaRPr lang="es-ES"/>
           </a:p>
@@ -5755,7 +5755,7 @@
               <a:pPr>
                 <a:defRPr/>
               </a:pPr>
-              <a:t>18/10/2022</a:t>
+              <a:t>28/10/2022</a:t>
             </a:fld>
             <a:endParaRPr lang="es-ES"/>
           </a:p>
@@ -6032,7 +6032,7 @@
               <a:pPr>
                 <a:defRPr/>
               </a:pPr>
-              <a:t>18/10/2022</a:t>
+              <a:t>28/10/2022</a:t>
             </a:fld>
             <a:endParaRPr lang="es-ES"/>
           </a:p>
@@ -6288,7 +6288,7 @@
               <a:pPr>
                 <a:defRPr/>
               </a:pPr>
-              <a:t>18/10/2022</a:t>
+              <a:t>28/10/2022</a:t>
             </a:fld>
             <a:endParaRPr lang="es-ES"/>
           </a:p>
@@ -7076,7 +7076,7 @@
               <a:pPr>
                 <a:defRPr/>
               </a:pPr>
-              <a:t>18/10/2022</a:t>
+              <a:t>28/10/2022</a:t>
             </a:fld>
             <a:endParaRPr lang="es-ES"/>
           </a:p>
@@ -7795,22 +7795,46 @@
               </a:spcBef>
             </a:pPr>
             <a:r>
-              <a:rPr lang="es-ES" sz="2300" b="1"/>
-              <a:t>&lt;h:graphicImage/&gt;</a:t>
-            </a:r>
-            <a:r>
-              <a:rPr lang="es-ES" sz="2300"/>
+              <a:rPr lang="es-ES" sz="2300" b="1" dirty="0"/>
+              <a:t>&lt;</a:t>
+            </a:r>
+            <a:r>
+              <a:rPr lang="es-ES" sz="2300" b="1" dirty="0" err="1"/>
+              <a:t>h:graphicImage</a:t>
+            </a:r>
+            <a:r>
+              <a:rPr lang="es-ES" sz="2300" b="1" dirty="0"/>
+              <a:t>/&gt;</a:t>
+            </a:r>
+            <a:r>
+              <a:rPr lang="es-ES" sz="2300" dirty="0"/>
               <a:t>:Simple imagen. Hay que tener en cuenta que los recursos se van a buscar por defecto a una carpeta llamada </a:t>
             </a:r>
             <a:r>
-              <a:rPr lang="es-ES" sz="2300" b="1"/>
+              <a:rPr lang="es-ES" sz="2300" b="1" dirty="0" err="1"/>
               <a:t>resources</a:t>
             </a:r>
             <a:r>
-              <a:rPr lang="es-ES" sz="2300"/>
+              <a:rPr lang="es-ES" sz="2300" b="1" dirty="0"/>
+              <a:t> </a:t>
+            </a:r>
+            <a:r>
+              <a:rPr lang="es-ES" sz="2300" dirty="0"/>
+              <a:t>dentro de</a:t>
+            </a:r>
+            <a:r>
+              <a:rPr lang="es-ES" sz="2300" b="1" dirty="0"/>
+              <a:t> </a:t>
+            </a:r>
+            <a:r>
+              <a:rPr lang="es-ES" sz="2300" b="1" dirty="0" err="1"/>
+              <a:t>webapp</a:t>
+            </a:r>
+            <a:r>
+              <a:rPr lang="es-ES" sz="2300" dirty="0"/>
               <a:t>.</a:t>
             </a:r>
-            <a:endParaRPr lang="es-ES" sz="2300" b="1"/>
+            <a:endParaRPr lang="es-ES" sz="2300" b="1" dirty="0"/>
           </a:p>
           <a:p>
             <a:pPr eaLnBrk="1" hangingPunct="1">
@@ -7821,7 +7845,7 @@
               <a:buNone/>
             </a:pPr>
             <a:r>
-              <a:rPr lang="es-ES" sz="2300"/>
+              <a:rPr lang="es-ES" sz="2300" dirty="0"/>
               <a:t>Ejemplo</a:t>
             </a:r>
           </a:p>
@@ -7834,8 +7858,16 @@
               <a:buNone/>
             </a:pPr>
             <a:r>
-              <a:rPr lang="en-US" sz="2100"/>
-              <a:t>&lt;h:graphicImage library="images" name="sofa.png" /&gt;</a:t>
+              <a:rPr lang="en-US" sz="2100" dirty="0"/>
+              <a:t>&lt;</a:t>
+            </a:r>
+            <a:r>
+              <a:rPr lang="en-US" sz="2100" dirty="0" err="1"/>
+              <a:t>h:graphicImage</a:t>
+            </a:r>
+            <a:r>
+              <a:rPr lang="en-US" sz="2100" dirty="0"/>
+              <a:t> library="images" name="sofa.png" /&gt;</a:t>
             </a:r>
           </a:p>
           <a:p>
@@ -7847,18 +7879,54 @@
               <a:buNone/>
             </a:pPr>
             <a:r>
-              <a:rPr lang="en-US" sz="2100"/>
-              <a:t>En este caso iremos a buscar la imagen a “</a:t>
-            </a:r>
-            <a:r>
-              <a:rPr lang="en-US" sz="2100" b="1"/>
+              <a:rPr lang="en-US" sz="2100" dirty="0" err="1"/>
+              <a:t>En</a:t>
+            </a:r>
+            <a:r>
+              <a:rPr lang="en-US" sz="2100" dirty="0"/>
+              <a:t> </a:t>
+            </a:r>
+            <a:r>
+              <a:rPr lang="en-US" sz="2100" dirty="0" err="1"/>
+              <a:t>este</a:t>
+            </a:r>
+            <a:r>
+              <a:rPr lang="en-US" sz="2100" dirty="0"/>
+              <a:t> </a:t>
+            </a:r>
+            <a:r>
+              <a:rPr lang="en-US" sz="2100" dirty="0" err="1"/>
+              <a:t>caso</a:t>
+            </a:r>
+            <a:r>
+              <a:rPr lang="en-US" sz="2100" dirty="0"/>
+              <a:t> </a:t>
+            </a:r>
+            <a:r>
+              <a:rPr lang="en-US" sz="2100" dirty="0" err="1"/>
+              <a:t>iremos</a:t>
+            </a:r>
+            <a:r>
+              <a:rPr lang="en-US" sz="2100" dirty="0"/>
+              <a:t> a </a:t>
+            </a:r>
+            <a:r>
+              <a:rPr lang="en-US" sz="2100" dirty="0" err="1"/>
+              <a:t>buscar</a:t>
+            </a:r>
+            <a:r>
+              <a:rPr lang="en-US" sz="2100" dirty="0"/>
+              <a:t> la imagen a “</a:t>
+            </a:r>
+            <a:r>
+              <a:rPr lang="en-US" sz="2100" b="1" dirty="0"/>
               <a:t>resources/images/sofa.png</a:t>
             </a:r>
             <a:r>
-              <a:rPr lang="en-US" sz="2100"/>
+              <a:rPr lang="en-US" sz="2100" dirty="0"/>
               <a:t>”</a:t>
             </a:r>
-            <a:endParaRPr lang="es-ES" sz="2100"/>
+            <a:endParaRPr lang="es-ES" sz="2100" dirty="0"/>
           </a:p>
           <a:p>
             <a:pPr eaLnBrk="1" hangingPunct="1">
@@ -7867,12 +7935,28 @@
               </a:spcBef>
             </a:pPr>
             <a:r>
-              <a:rPr lang="es-ES" sz="2300" b="1"/>
-              <a:t>&lt;h:outputStylesheet/&gt;: </a:t>
-            </a:r>
-            <a:r>
-              <a:rPr lang="es-ES" sz="2300"/>
-              <a:t>Cargar una librería css.</a:t>
+              <a:rPr lang="es-ES" sz="2300" b="1" dirty="0"/>
+              <a:t>&lt;</a:t>
+            </a:r>
+            <a:r>
+              <a:rPr lang="es-ES" sz="2300" b="1" dirty="0" err="1"/>
+              <a:t>h:outputStylesheet</a:t>
+            </a:r>
+            <a:r>
+              <a:rPr lang="es-ES" sz="2300" b="1" dirty="0"/>
+              <a:t>/&gt;: </a:t>
+            </a:r>
+            <a:r>
+              <a:rPr lang="es-ES" sz="2300" dirty="0"/>
+              <a:t>Cargar una librería </a:t>
+            </a:r>
+            <a:r>
+              <a:rPr lang="es-ES" sz="2300" dirty="0" err="1"/>
+              <a:t>css</a:t>
+            </a:r>
+            <a:r>
+              <a:rPr lang="es-ES" sz="2300" dirty="0"/>
+              <a:t>.</a:t>
             </a:r>
           </a:p>
           <a:p>
@@ -7884,7 +7968,7 @@
               <a:buNone/>
             </a:pPr>
             <a:r>
-              <a:rPr lang="es-ES" sz="2300"/>
+              <a:rPr lang="es-ES" sz="2300" dirty="0"/>
               <a:t>Ejemplo</a:t>
             </a:r>
           </a:p>
@@ -7897,18 +7981,34 @@
               <a:buNone/>
             </a:pPr>
             <a:r>
-              <a:rPr lang="en-US" sz="2100"/>
-              <a:t>&lt;h:outputStylesheet library="css" name="style.css" /&gt;</a:t>
-            </a:r>
-            <a:endParaRPr lang="es-ES" sz="2100"/>
+              <a:rPr lang="en-US" sz="2100" dirty="0"/>
+              <a:t>&lt;</a:t>
+            </a:r>
+            <a:r>
+              <a:rPr lang="en-US" sz="2100" dirty="0" err="1"/>
+              <a:t>h:outputStylesheet</a:t>
+            </a:r>
+            <a:r>
+              <a:rPr lang="en-US" sz="2100" dirty="0"/>
+              <a:t> library="</a:t>
+            </a:r>
+            <a:r>
+              <a:rPr lang="en-US" sz="2100" dirty="0" err="1"/>
+              <a:t>css</a:t>
+            </a:r>
+            <a:r>
+              <a:rPr lang="en-US" sz="2100" dirty="0"/>
+              <a:t>" name="style.css" /&gt;</a:t>
+            </a:r>
+            <a:endParaRPr lang="es-ES" sz="2100" dirty="0"/>
           </a:p>
           <a:p>
             <a:pPr eaLnBrk="1" hangingPunct="1"/>
-            <a:endParaRPr lang="es-ES" sz="2300"/>
+            <a:endParaRPr lang="es-ES" sz="2300" dirty="0"/>
           </a:p>
           <a:p>
             <a:pPr eaLnBrk="1" hangingPunct="1"/>
-            <a:endParaRPr lang="es-ES"/>
+            <a:endParaRPr lang="es-ES" dirty="0"/>
           </a:p>
         </p:txBody>
       </p:sp>
@@ -8031,12 +8131,28 @@
               </a:spcBef>
             </a:pPr>
             <a:r>
-              <a:rPr lang="es-ES" sz="2300" b="1"/>
-              <a:t>&lt;h:outputScript/&gt;: </a:t>
-            </a:r>
-            <a:r>
-              <a:rPr lang="es-ES" sz="2300"/>
-              <a:t>Cargar una librería javascript.</a:t>
+              <a:rPr lang="es-ES" sz="2300" b="1" dirty="0"/>
+              <a:t>&lt;</a:t>
+            </a:r>
+            <a:r>
+              <a:rPr lang="es-ES" sz="2300" b="1" dirty="0" err="1"/>
+              <a:t>h:outputScript</a:t>
+            </a:r>
+            <a:r>
+              <a:rPr lang="es-ES" sz="2300" b="1" dirty="0"/>
+              <a:t>/&gt;: </a:t>
+            </a:r>
+            <a:r>
+              <a:rPr lang="es-ES" sz="2300" dirty="0"/>
+              <a:t>Cargar una librería </a:t>
+            </a:r>
+            <a:r>
+              <a:rPr lang="es-ES" sz="2300" dirty="0" err="1"/>
+              <a:t>javascript</a:t>
+            </a:r>
+            <a:r>
+              <a:rPr lang="es-ES" sz="2300" dirty="0"/>
+              <a:t>.</a:t>
             </a:r>
           </a:p>
           <a:p>
@@ -8048,7 +8164,7 @@
               <a:buNone/>
             </a:pPr>
             <a:r>
-              <a:rPr lang="es-ES" sz="2300"/>
+              <a:rPr lang="es-ES" sz="2300" dirty="0"/>
               <a:t>Ejemplo</a:t>
             </a:r>
           </a:p>
@@ -8061,18 +8177,34 @@
               <a:buNone/>
             </a:pPr>
             <a:r>
-              <a:rPr lang="en-US" sz="2100"/>
-              <a:t>&lt;h:outputScript library=“js" name=“javascript.js" /&gt;</a:t>
-            </a:r>
-            <a:endParaRPr lang="es-ES" sz="2100"/>
+              <a:rPr lang="en-US" sz="2100" dirty="0"/>
+              <a:t>&lt;</a:t>
+            </a:r>
+            <a:r>
+              <a:rPr lang="en-US" sz="2100" dirty="0" err="1"/>
+              <a:t>h:outputScript</a:t>
+            </a:r>
+            <a:r>
+              <a:rPr lang="en-US" sz="2100" dirty="0"/>
+              <a:t> library=“</a:t>
+            </a:r>
+            <a:r>
+              <a:rPr lang="en-US" sz="2100" dirty="0" err="1"/>
+              <a:t>js</a:t>
+            </a:r>
+            <a:r>
+              <a:rPr lang="en-US" sz="2100" dirty="0"/>
+              <a:t>" name=“javascript.js" /&gt;</a:t>
+            </a:r>
+            <a:endParaRPr lang="es-ES" sz="2100" dirty="0"/>
           </a:p>
           <a:p>
             <a:pPr eaLnBrk="1" hangingPunct="1"/>
-            <a:endParaRPr lang="es-ES" sz="2300"/>
+            <a:endParaRPr lang="es-ES" sz="2300" dirty="0"/>
           </a:p>
           <a:p>
             <a:pPr eaLnBrk="1" hangingPunct="1"/>
-            <a:endParaRPr lang="es-ES"/>
+            <a:endParaRPr lang="es-ES" dirty="0"/>
           </a:p>
         </p:txBody>
       </p:sp>
@@ -8191,27 +8323,75 @@
           <a:p>
             <a:pPr eaLnBrk="1" hangingPunct="1"/>
             <a:r>
-              <a:rPr lang="es-ES" b="1"/>
+              <a:rPr lang="es-ES" b="1" dirty="0"/>
               <a:t>HTML: Componentes de acción</a:t>
             </a:r>
           </a:p>
           <a:p>
             <a:pPr lvl="1" eaLnBrk="1" hangingPunct="1"/>
             <a:r>
-              <a:rPr lang="es-ES"/>
-              <a:t>&lt;h:commandButton/&gt;: Botón: submit, reset o pushbutton.</a:t>
+              <a:rPr lang="es-ES" dirty="0"/>
+              <a:t>&lt;</a:t>
+            </a:r>
+            <a:r>
+              <a:rPr lang="es-ES" dirty="0" err="1"/>
+              <a:t>h:commandButton</a:t>
+            </a:r>
+            <a:r>
+              <a:rPr lang="es-ES" dirty="0"/>
+              <a:t>/&gt;: Botón: </a:t>
+            </a:r>
+            <a:r>
+              <a:rPr lang="es-ES" dirty="0" err="1"/>
+              <a:t>submit</a:t>
+            </a:r>
+            <a:r>
+              <a:rPr lang="es-ES" dirty="0"/>
+              <a:t>, </a:t>
+            </a:r>
+            <a:r>
+              <a:rPr lang="es-ES" dirty="0" err="1"/>
+              <a:t>reset</a:t>
+            </a:r>
+            <a:r>
+              <a:rPr lang="es-ES" dirty="0"/>
+              <a:t> o </a:t>
+            </a:r>
+            <a:r>
+              <a:rPr lang="es-ES" dirty="0" err="1"/>
+              <a:t>pushbutton</a:t>
+            </a:r>
+            <a:r>
+              <a:rPr lang="es-ES" dirty="0"/>
+              <a:t>.</a:t>
             </a:r>
           </a:p>
           <a:p>
             <a:pPr lvl="1" eaLnBrk="1" hangingPunct="1"/>
             <a:r>
-              <a:rPr lang="es-ES"/>
-              <a:t>&lt;h:commandLink/&gt;: Enlace asociado a un botón pushbutton.</a:t>
+              <a:rPr lang="es-ES" dirty="0"/>
+              <a:t>&lt;</a:t>
+            </a:r>
+            <a:r>
+              <a:rPr lang="es-ES" dirty="0" err="1"/>
+              <a:t>h:commandLink</a:t>
+            </a:r>
+            <a:r>
+              <a:rPr lang="es-ES" dirty="0"/>
+              <a:t>/&gt;: Enlace asociado a un botón </a:t>
+            </a:r>
+            <a:r>
+              <a:rPr lang="es-ES" dirty="0" err="1"/>
+              <a:t>pushbutton</a:t>
+            </a:r>
+            <a:r>
+              <a:rPr lang="es-ES" dirty="0"/>
+              <a:t>.</a:t>
             </a:r>
           </a:p>
           <a:p>
             <a:pPr eaLnBrk="1" hangingPunct="1"/>
-            <a:endParaRPr lang="es-ES"/>
+            <a:endParaRPr lang="es-ES" dirty="0"/>
           </a:p>
         </p:txBody>
       </p:sp>
@@ -8616,35 +8796,67 @@
           <a:p>
             <a:pPr eaLnBrk="1" hangingPunct="1"/>
             <a:r>
-              <a:rPr lang="es-ES" sz="2300" b="1"/>
-              <a:t>&lt;h:selectBooleanCheckbox/&gt;</a:t>
-            </a:r>
-            <a:r>
-              <a:rPr lang="es-ES" sz="2300"/>
-              <a:t>: Checkbox simple, se guarda en un booleano.</a:t>
+              <a:rPr lang="es-ES" sz="2300" b="1" dirty="0"/>
+              <a:t>&lt;</a:t>
+            </a:r>
+            <a:r>
+              <a:rPr lang="es-ES" sz="2300" b="1" dirty="0" err="1"/>
+              <a:t>h:selectBooleanCheckbox</a:t>
+            </a:r>
+            <a:r>
+              <a:rPr lang="es-ES" sz="2300" b="1" dirty="0"/>
+              <a:t>/&gt;</a:t>
+            </a:r>
+            <a:r>
+              <a:rPr lang="es-ES" sz="2300" dirty="0"/>
+              <a:t>: </a:t>
+            </a:r>
+            <a:r>
+              <a:rPr lang="es-ES" sz="2300" dirty="0" err="1"/>
+              <a:t>Checkbox</a:t>
+            </a:r>
+            <a:r>
+              <a:rPr lang="es-ES" sz="2300" dirty="0"/>
+              <a:t> simple, se guarda en un booleano.</a:t>
             </a:r>
           </a:p>
           <a:p>
             <a:pPr eaLnBrk="1" hangingPunct="1"/>
             <a:r>
-              <a:rPr lang="es-ES" sz="2300" b="1"/>
-              <a:t>&lt;h:selectManyCheckbox /&gt;</a:t>
-            </a:r>
-            <a:r>
-              <a:rPr lang="es-ES" sz="2300"/>
-              <a:t>: Checkbox con varias casillas a marcar una o varias, se guarda en un Array. </a:t>
+              <a:rPr lang="es-ES" sz="2300" b="1" dirty="0"/>
+              <a:t>&lt;</a:t>
+            </a:r>
+            <a:r>
+              <a:rPr lang="es-ES" sz="2300" b="1" dirty="0" err="1"/>
+              <a:t>h:selectManyCheckbox</a:t>
+            </a:r>
+            <a:r>
+              <a:rPr lang="es-ES" sz="2300" b="1" dirty="0"/>
+              <a:t> /&gt;</a:t>
+            </a:r>
+            <a:r>
+              <a:rPr lang="es-ES" sz="2300" dirty="0"/>
+              <a:t>: </a:t>
+            </a:r>
+            <a:r>
+              <a:rPr lang="es-ES" sz="2300" dirty="0" err="1"/>
+              <a:t>Checkbox</a:t>
+            </a:r>
+            <a:r>
+              <a:rPr lang="es-ES" sz="2300" dirty="0"/>
+              <a:t> con varias casillas a marcar una o varias, se guarda en un Array. </a:t>
             </a:r>
           </a:p>
           <a:p>
             <a:pPr eaLnBrk="1" hangingPunct="1"/>
             <a:r>
-              <a:rPr lang="es-ES" sz="2300"/>
+              <a:rPr lang="es-ES" sz="2300" dirty="0"/>
               <a:t>Ejemplo</a:t>
             </a:r>
           </a:p>
           <a:p>
             <a:pPr eaLnBrk="1" hangingPunct="1"/>
-            <a:endParaRPr lang="es-ES" sz="2300"/>
+            <a:endParaRPr lang="es-ES" sz="2300" dirty="0"/>
           </a:p>
           <a:p>
             <a:pPr eaLnBrk="1" hangingPunct="1">
@@ -8652,22 +8864,122 @@
               <a:buNone/>
             </a:pPr>
             <a:r>
-              <a:rPr lang="es-ES" sz="2300"/>
-              <a:t>&lt;h:selectManyCheckbox value="#{user.arraynumero}"&gt; &lt;f:selectItem itemValue="1" itemLabel="Numero 1" /&gt; &lt;f:selectItem itemValue="2" itemLabel="Numero 2" /&gt; &lt;f:selectItem itemValue="3" itemLabel="Numero 3" /&gt; &lt;/h:selectManyCheckbox</a:t>
-            </a:r>
-            <a:r>
-              <a:rPr lang="es-ES" sz="2300">
+              <a:rPr lang="es-ES" sz="2300" dirty="0"/>
+              <a:t>&lt;</a:t>
+            </a:r>
+            <a:r>
+              <a:rPr lang="es-ES" sz="2300" dirty="0" err="1"/>
+              <a:t>h:selectManyCheckbox</a:t>
+            </a:r>
+            <a:r>
+              <a:rPr lang="es-ES" sz="2300" dirty="0"/>
+              <a:t> </a:t>
+            </a:r>
+            <a:r>
+              <a:rPr lang="es-ES" sz="2300" dirty="0" err="1"/>
+              <a:t>value</a:t>
+            </a:r>
+            <a:r>
+              <a:rPr lang="es-ES" sz="2300" dirty="0"/>
+              <a:t>="#{</a:t>
+            </a:r>
+            <a:r>
+              <a:rPr lang="es-ES" sz="2300" dirty="0" err="1"/>
+              <a:t>user.arrayNumero</a:t>
+            </a:r>
+            <a:r>
+              <a:rPr lang="es-ES" sz="2300" dirty="0"/>
+              <a:t>}"&gt; &lt;</a:t>
+            </a:r>
+            <a:r>
+              <a:rPr lang="es-ES" sz="2300" dirty="0" err="1"/>
+              <a:t>f:selectItem</a:t>
+            </a:r>
+            <a:r>
+              <a:rPr lang="es-ES" sz="2300" dirty="0"/>
+              <a:t> </a:t>
+            </a:r>
+            <a:r>
+              <a:rPr lang="es-ES" sz="2300" dirty="0" err="1"/>
+              <a:t>itemValue</a:t>
+            </a:r>
+            <a:r>
+              <a:rPr lang="es-ES" sz="2300" dirty="0"/>
+              <a:t>="1" </a:t>
+            </a:r>
+            <a:r>
+              <a:rPr lang="es-ES" sz="2300" dirty="0" err="1"/>
+              <a:t>itemLabel</a:t>
+            </a:r>
+            <a:r>
+              <a:rPr lang="es-ES" sz="2300" dirty="0"/>
+              <a:t>="Numero 1" /&gt; &lt;</a:t>
+            </a:r>
+            <a:r>
+              <a:rPr lang="es-ES" sz="2300" dirty="0" err="1"/>
+              <a:t>f:selectItem</a:t>
+            </a:r>
+            <a:r>
+              <a:rPr lang="es-ES" sz="2300" dirty="0"/>
+              <a:t> </a:t>
+            </a:r>
+            <a:r>
+              <a:rPr lang="es-ES" sz="2300" dirty="0" err="1"/>
+              <a:t>itemValue</a:t>
+            </a:r>
+            <a:r>
+              <a:rPr lang="es-ES" sz="2300" dirty="0"/>
+              <a:t>="2" </a:t>
+            </a:r>
+            <a:r>
+              <a:rPr lang="es-ES" sz="2300" dirty="0" err="1"/>
+              <a:t>itemLabel</a:t>
+            </a:r>
+            <a:r>
+              <a:rPr lang="es-ES" sz="2300" dirty="0"/>
+              <a:t>="Numero 2" /&gt; &lt;</a:t>
+            </a:r>
+            <a:r>
+              <a:rPr lang="es-ES" sz="2300" dirty="0" err="1"/>
+              <a:t>f:selectItem</a:t>
+            </a:r>
+            <a:r>
+              <a:rPr lang="es-ES" sz="2300" dirty="0"/>
+              <a:t> </a:t>
+            </a:r>
+            <a:r>
+              <a:rPr lang="es-ES" sz="2300" dirty="0" err="1"/>
+              <a:t>itemValue</a:t>
+            </a:r>
+            <a:r>
+              <a:rPr lang="es-ES" sz="2300" dirty="0"/>
+              <a:t>="3" </a:t>
+            </a:r>
+            <a:r>
+              <a:rPr lang="es-ES" sz="2300" dirty="0" err="1"/>
+              <a:t>itemLabel</a:t>
+            </a:r>
+            <a:r>
+              <a:rPr lang="es-ES" sz="2300" dirty="0"/>
+              <a:t>="Numero 3" /&gt; &lt;/</a:t>
+            </a:r>
+            <a:r>
+              <a:rPr lang="es-ES" sz="2300" dirty="0" err="1"/>
+              <a:t>h:selectManyCheckbox</a:t>
+            </a:r>
+            <a:r>
+              <a:rPr lang="es-ES" sz="2300" dirty="0">
                 <a:solidFill>
                   <a:srgbClr val="009900"/>
                 </a:solidFill>
               </a:rPr>
               <a:t>&gt;</a:t>
             </a:r>
-            <a:endParaRPr lang="es-ES" sz="2300"/>
+            <a:endParaRPr lang="es-ES" sz="2300" dirty="0"/>
           </a:p>
           <a:p>
             <a:pPr eaLnBrk="1" hangingPunct="1"/>
-            <a:endParaRPr lang="es-ES"/>
+            <a:endParaRPr lang="es-ES" dirty="0"/>
           </a:p>
         </p:txBody>
       </p:sp>
@@ -8786,13 +9098,13 @@
           <a:p>
             <a:pPr eaLnBrk="1" hangingPunct="1"/>
             <a:r>
-              <a:rPr lang="es-ES" sz="2300"/>
+              <a:rPr lang="es-ES" sz="2300" dirty="0"/>
               <a:t>Ejemplo generado por Array</a:t>
             </a:r>
           </a:p>
           <a:p>
             <a:pPr eaLnBrk="1" hangingPunct="1"/>
-            <a:endParaRPr lang="es-ES" sz="2300"/>
+            <a:endParaRPr lang="es-ES" sz="2300" dirty="0"/>
           </a:p>
           <a:p>
             <a:pPr eaLnBrk="1" hangingPunct="1">
@@ -8800,8 +9112,56 @@
               <a:buNone/>
             </a:pPr>
             <a:r>
-              <a:rPr lang="es-ES" sz="2300"/>
-              <a:t>&lt;h:selectManyCheckbox value="#{user.arraynumero}"&gt; &lt;f:selectItems value="#{user.arrayLiterales}" /&gt; &lt;/h:selectManyCheckbox&gt;</a:t>
+              <a:rPr lang="es-ES" sz="2300" dirty="0"/>
+              <a:t>&lt;</a:t>
+            </a:r>
+            <a:r>
+              <a:rPr lang="es-ES" sz="2300" dirty="0" err="1"/>
+              <a:t>h:selectManyCheckbox</a:t>
+            </a:r>
+            <a:r>
+              <a:rPr lang="es-ES" sz="2300" dirty="0"/>
+              <a:t> </a:t>
+            </a:r>
+            <a:r>
+              <a:rPr lang="es-ES" sz="2300" dirty="0" err="1"/>
+              <a:t>value</a:t>
+            </a:r>
+            <a:r>
+              <a:rPr lang="es-ES" sz="2300" dirty="0"/>
+              <a:t>="#{</a:t>
+            </a:r>
+            <a:r>
+              <a:rPr lang="es-ES" sz="2300" dirty="0" err="1"/>
+              <a:t>user.arrayNumero</a:t>
+            </a:r>
+            <a:r>
+              <a:rPr lang="es-ES" sz="2300" dirty="0"/>
+              <a:t>}"&gt; &lt;</a:t>
+            </a:r>
+            <a:r>
+              <a:rPr lang="es-ES" sz="2300" dirty="0" err="1"/>
+              <a:t>f:selectItems</a:t>
+            </a:r>
+            <a:r>
+              <a:rPr lang="es-ES" sz="2300" dirty="0"/>
+              <a:t> </a:t>
+            </a:r>
+            <a:r>
+              <a:rPr lang="es-ES" sz="2300" dirty="0" err="1"/>
+              <a:t>value</a:t>
+            </a:r>
+            <a:r>
+              <a:rPr lang="es-ES" sz="2300" dirty="0"/>
+              <a:t>="#{</a:t>
+            </a:r>
+            <a:r>
+              <a:rPr lang="es-ES" sz="2300" dirty="0" err="1"/>
+              <a:t>user.arrayLiterales</a:t>
+            </a:r>
+            <a:r>
+              <a:rPr lang="es-ES" sz="2300" dirty="0"/>
+              <a:t>}" /&gt;</a:t>
             </a:r>
           </a:p>
           <a:p>
@@ -8809,32 +9169,146 @@
               <a:buFont typeface="Arial" charset="0"/>
               <a:buNone/>
             </a:pPr>
-            <a:endParaRPr lang="es-ES" sz="2300"/>
-          </a:p>
-          <a:p>
-            <a:pPr eaLnBrk="1" hangingPunct="1"/>
-            <a:r>
-              <a:rPr lang="es-ES" sz="2300"/>
-              <a:t>Ejemplo generado por un array de objetos</a:t>
-            </a:r>
-          </a:p>
-          <a:p>
-            <a:pPr eaLnBrk="1" hangingPunct="1"/>
-            <a:endParaRPr lang="es-ES" sz="2300"/>
+            <a:r>
+              <a:rPr lang="es-ES" sz="2300" dirty="0"/>
+              <a:t>&lt;/</a:t>
+            </a:r>
+            <a:r>
+              <a:rPr lang="es-ES" sz="2300" dirty="0" err="1"/>
+              <a:t>h:selectManyCheckbox</a:t>
+            </a:r>
+            <a:r>
+              <a:rPr lang="es-ES" sz="2300" dirty="0"/>
+              <a:t>&gt;</a:t>
+            </a:r>
           </a:p>
           <a:p>
             <a:pPr eaLnBrk="1" hangingPunct="1">
               <a:buFont typeface="Arial" charset="0"/>
               <a:buNone/>
             </a:pPr>
-            <a:r>
-              <a:rPr lang="es-ES" sz="2300"/>
-              <a:t>&lt;h:selectManyCheckbox value="#{user.arraydnis}"&gt; &lt;f:selectItems value="#{manage.arraypersonas}" var=“p" itemLabel="#{p.nombre}" itemValue="#{p.dni}" /&gt; &lt;/h:selectManyCheckbox&gt;</a:t>
-            </a:r>
+            <a:endParaRPr lang="es-ES" sz="2300" dirty="0"/>
           </a:p>
           <a:p>
             <a:pPr eaLnBrk="1" hangingPunct="1"/>
-            <a:endParaRPr lang="es-ES"/>
+            <a:r>
+              <a:rPr lang="es-ES" sz="2300" dirty="0"/>
+              <a:t>Ejemplo generado por un array de objetos</a:t>
+            </a:r>
+          </a:p>
+          <a:p>
+            <a:pPr eaLnBrk="1" hangingPunct="1"/>
+            <a:endParaRPr lang="es-ES" sz="2300" dirty="0"/>
+          </a:p>
+          <a:p>
+            <a:pPr eaLnBrk="1" hangingPunct="1">
+              <a:buFont typeface="Arial" charset="0"/>
+              <a:buNone/>
+            </a:pPr>
+            <a:r>
+              <a:rPr lang="es-ES" sz="2300" dirty="0"/>
+              <a:t>&lt;</a:t>
+            </a:r>
+            <a:r>
+              <a:rPr lang="es-ES" sz="2300" dirty="0" err="1"/>
+              <a:t>h:selectManyCheckbox</a:t>
+            </a:r>
+            <a:r>
+              <a:rPr lang="es-ES" sz="2300" dirty="0"/>
+              <a:t> </a:t>
+            </a:r>
+            <a:r>
+              <a:rPr lang="es-ES" sz="2300" dirty="0" err="1"/>
+              <a:t>value</a:t>
+            </a:r>
+            <a:r>
+              <a:rPr lang="es-ES" sz="2300" dirty="0"/>
+              <a:t>="#{</a:t>
+            </a:r>
+            <a:r>
+              <a:rPr lang="es-ES" sz="2300" dirty="0" err="1"/>
+              <a:t>user.arrayDnis</a:t>
+            </a:r>
+            <a:r>
+              <a:rPr lang="es-ES" sz="2300" dirty="0"/>
+              <a:t>}"&gt; &lt;</a:t>
+            </a:r>
+            <a:r>
+              <a:rPr lang="es-ES" sz="2300" dirty="0" err="1"/>
+              <a:t>f:selectItems</a:t>
+            </a:r>
+            <a:r>
+              <a:rPr lang="es-ES" sz="2300" dirty="0"/>
+              <a:t> </a:t>
+            </a:r>
+            <a:r>
+              <a:rPr lang="es-ES" sz="2300" dirty="0" err="1"/>
+              <a:t>value</a:t>
+            </a:r>
+            <a:r>
+              <a:rPr lang="es-ES" sz="2300" dirty="0"/>
+              <a:t>="#{</a:t>
+            </a:r>
+            <a:r>
+              <a:rPr lang="es-ES" sz="2300" dirty="0" err="1"/>
+              <a:t>manage.arrayPersonas</a:t>
+            </a:r>
+            <a:r>
+              <a:rPr lang="es-ES" sz="2300" dirty="0"/>
+              <a:t>}" </a:t>
+            </a:r>
+            <a:r>
+              <a:rPr lang="es-ES" sz="2300" dirty="0" err="1"/>
+              <a:t>var</a:t>
+            </a:r>
+            <a:r>
+              <a:rPr lang="es-ES" sz="2300" dirty="0"/>
+              <a:t>=“p" </a:t>
+            </a:r>
+            <a:r>
+              <a:rPr lang="es-ES" sz="2300" dirty="0" err="1"/>
+              <a:t>itemLabel</a:t>
+            </a:r>
+            <a:r>
+              <a:rPr lang="es-ES" sz="2300" dirty="0"/>
+              <a:t>="#{</a:t>
+            </a:r>
+            <a:r>
+              <a:rPr lang="es-ES" sz="2300" dirty="0" err="1"/>
+              <a:t>p.nombre</a:t>
+            </a:r>
+            <a:r>
+              <a:rPr lang="es-ES" sz="2300" dirty="0"/>
+              <a:t>}" </a:t>
+            </a:r>
+            <a:r>
+              <a:rPr lang="es-ES" sz="2300" dirty="0" err="1"/>
+              <a:t>itemValue</a:t>
+            </a:r>
+            <a:r>
+              <a:rPr lang="es-ES" sz="2300" dirty="0"/>
+              <a:t>="#{</a:t>
+            </a:r>
+            <a:r>
+              <a:rPr lang="es-ES" sz="2300" dirty="0" err="1"/>
+              <a:t>p.dni</a:t>
+            </a:r>
+            <a:r>
+              <a:rPr lang="es-ES" sz="2300" dirty="0"/>
+              <a:t>}" /&gt; &lt;/</a:t>
+            </a:r>
+            <a:r>
+              <a:rPr lang="es-ES" sz="2300" dirty="0" err="1"/>
+              <a:t>h:selectManyCheckbox</a:t>
+            </a:r>
+            <a:r>
+              <a:rPr lang="es-ES" sz="2300" dirty="0"/>
+              <a:t>&gt;</a:t>
+            </a:r>
+          </a:p>
+          <a:p>
+            <a:pPr eaLnBrk="1" hangingPunct="1"/>
+            <a:endParaRPr lang="es-ES" dirty="0"/>
           </a:p>
         </p:txBody>
       </p:sp>
@@ -9621,47 +10095,68 @@
           <a:p>
             <a:pPr eaLnBrk="1" hangingPunct="1"/>
             <a:r>
-              <a:rPr lang="es-ES"/>
+              <a:rPr lang="es-ES" dirty="0"/>
               <a:t>Las vistas en JSF, se pueden componer en </a:t>
             </a:r>
             <a:r>
-              <a:rPr lang="es-ES" b="1"/>
+              <a:rPr lang="es-ES" b="1" dirty="0" err="1"/>
               <a:t>jsp</a:t>
             </a:r>
             <a:r>
-              <a:rPr lang="es-ES"/>
+              <a:rPr lang="es-ES" dirty="0"/>
               <a:t> o en </a:t>
             </a:r>
             <a:r>
-              <a:rPr lang="es-ES" b="1"/>
+              <a:rPr lang="es-ES" b="1" dirty="0" err="1"/>
               <a:t>xhtml</a:t>
             </a:r>
             <a:r>
-              <a:rPr lang="es-ES"/>
+              <a:rPr lang="es-ES" dirty="0"/>
               <a:t>.</a:t>
             </a:r>
           </a:p>
           <a:p>
             <a:pPr eaLnBrk="1" hangingPunct="1"/>
             <a:r>
-              <a:rPr lang="es-ES"/>
+              <a:rPr lang="es-ES" dirty="0"/>
               <a:t>Se recomienda el empleo de </a:t>
             </a:r>
             <a:r>
-              <a:rPr lang="es-ES" b="1"/>
+              <a:rPr lang="es-ES" b="1" dirty="0" err="1"/>
               <a:t>xhtml</a:t>
             </a:r>
             <a:r>
-              <a:rPr lang="es-ES"/>
-              <a:t>, dado que JSP, conlleva una compilación a servlet, el cual no se emplea y ocupa espacio en memoria.</a:t>
+              <a:rPr lang="es-ES" dirty="0"/>
+              <a:t>, dado que JSP, conlleva una compilación a </a:t>
+            </a:r>
+            <a:r>
+              <a:rPr lang="es-ES" dirty="0" err="1"/>
+              <a:t>servlet</a:t>
+            </a:r>
+            <a:r>
+              <a:rPr lang="es-ES" dirty="0"/>
+              <a:t>, el cual no se emplea y ocupa espacio en memoria.</a:t>
             </a:r>
           </a:p>
           <a:p>
             <a:pPr eaLnBrk="1" hangingPunct="1"/>
             <a:r>
-              <a:rPr lang="es-ES"/>
-              <a:t>Hasta la especificación 1.2 se utilizaban JSPs, a partir de la 2.0 se emplean xhtml</a:t>
-            </a:r>
+              <a:rPr lang="es-ES" dirty="0"/>
+              <a:t>Hasta la especificación 1.2 se utilizaban </a:t>
+            </a:r>
+            <a:r>
+              <a:rPr lang="es-ES" dirty="0" err="1"/>
+              <a:t>JSPs</a:t>
+            </a:r>
+            <a:r>
+              <a:rPr lang="es-ES" dirty="0"/>
+              <a:t>, a partir de la 2.0 se emplean </a:t>
+            </a:r>
+            <a:r>
+              <a:rPr lang="es-ES" dirty="0" err="1"/>
+              <a:t>xhtml</a:t>
+            </a:r>
+            <a:endParaRPr lang="es-ES" dirty="0"/>
           </a:p>
         </p:txBody>
       </p:sp>
@@ -10365,7 +10860,7 @@
             </a:pPr>
             <a:r>
               <a:rPr lang="es-ES" sz="2300" dirty="0"/>
-              <a:t> 		&lt;!– Con esta etiqueta ponemos el nombre de la cabecera de la tabla --&gt;</a:t>
+              <a:t> 		&lt;!– Con esta etiqueta ponemos el nombre de la cabecera de la tabla (TH)--&gt;</a:t>
             </a:r>
           </a:p>
           <a:p>
@@ -10464,7 +10959,7 @@
             </a:r>
             <a:r>
               <a:rPr lang="es-ES" sz="2300" dirty="0" err="1"/>
-              <a:t>o.valor</a:t>
+              <a:t>o.propiedad</a:t>
             </a:r>
             <a:r>
               <a:rPr lang="es-ES" sz="2300" dirty="0"/>
@@ -10637,7 +11132,7 @@
                 <a:spcPts val="1263"/>
               </a:spcBef>
             </a:pPr>
-            <a:endParaRPr lang="es-ES" sz="2300"/>
+            <a:endParaRPr lang="es-ES" sz="2300" dirty="0"/>
           </a:p>
           <a:p>
             <a:pPr eaLnBrk="1" hangingPunct="1">
@@ -10646,31 +11141,47 @@
               </a:spcBef>
             </a:pPr>
             <a:r>
-              <a:rPr lang="es-ES" sz="2300"/>
+              <a:rPr lang="es-ES" sz="2300" dirty="0"/>
               <a:t>Podemos también simular un comportamiento repetitivo mediante la etiqueta </a:t>
             </a:r>
             <a:r>
-              <a:rPr lang="es-ES" sz="2300" b="1"/>
-              <a:t>&lt;ui:repeate&gt;</a:t>
-            </a:r>
-            <a:r>
-              <a:rPr lang="es-ES" sz="2300"/>
-              <a:t>, esta etiqueta se basa en repetir a partir de una fuente de datos, al igual que en la etiqueta datatable, tendrá un atributo </a:t>
-            </a:r>
-            <a:r>
-              <a:rPr lang="es-ES" sz="2300" b="1"/>
+              <a:rPr lang="es-ES" sz="2300" b="1" dirty="0"/>
+              <a:t>&lt;</a:t>
+            </a:r>
+            <a:r>
+              <a:rPr lang="es-ES" sz="2300" b="1" dirty="0" err="1"/>
+              <a:t>ui:repeate</a:t>
+            </a:r>
+            <a:r>
+              <a:rPr lang="es-ES" sz="2300" b="1" dirty="0"/>
+              <a:t>&gt;</a:t>
+            </a:r>
+            <a:r>
+              <a:rPr lang="es-ES" sz="2300" dirty="0"/>
+              <a:t>, esta etiqueta se basa en repetir a partir de una fuente de datos, al igual que en la etiqueta </a:t>
+            </a:r>
+            <a:r>
+              <a:rPr lang="es-ES" sz="2300" dirty="0" err="1"/>
+              <a:t>datatable</a:t>
+            </a:r>
+            <a:r>
+              <a:rPr lang="es-ES" sz="2300" dirty="0"/>
+              <a:t>, tendrá un atributo </a:t>
+            </a:r>
+            <a:r>
+              <a:rPr lang="es-ES" sz="2300" b="1" dirty="0" err="1"/>
               <a:t>value</a:t>
             </a:r>
             <a:r>
-              <a:rPr lang="es-ES" sz="2300"/>
+              <a:rPr lang="es-ES" sz="2300" dirty="0"/>
               <a:t> para meter la fuente de datos y otro </a:t>
             </a:r>
             <a:r>
-              <a:rPr lang="es-ES" sz="2300" b="1"/>
+              <a:rPr lang="es-ES" sz="2300" b="1" dirty="0" err="1"/>
               <a:t>var</a:t>
             </a:r>
             <a:r>
-              <a:rPr lang="es-ES" sz="2300"/>
+              <a:rPr lang="es-ES" sz="2300" dirty="0"/>
               <a:t> para cada una de las iteraciones.</a:t>
             </a:r>
           </a:p>
@@ -10681,8 +11192,16 @@
               </a:spcBef>
             </a:pPr>
             <a:r>
-              <a:rPr lang="es-ES" sz="2300"/>
-              <a:t>Esta etiqueta es lo más parecido a realizar un For como etiqueta propia de JSF. </a:t>
+              <a:rPr lang="es-ES" sz="2300" dirty="0"/>
+              <a:t>Esta etiqueta es lo más parecido a realizar un </a:t>
+            </a:r>
+            <a:r>
+              <a:rPr lang="es-ES" sz="2300" dirty="0" err="1"/>
+              <a:t>For</a:t>
+            </a:r>
+            <a:r>
+              <a:rPr lang="es-ES" sz="2300" dirty="0"/>
+              <a:t> como etiqueta propia de JSF. </a:t>
             </a:r>
           </a:p>
         </p:txBody>
@@ -10808,7 +11327,7 @@
               <a:buNone/>
             </a:pPr>
             <a:r>
-              <a:rPr lang="es-ES" sz="2300"/>
+              <a:rPr lang="es-ES" sz="2300" dirty="0"/>
               <a:t>&lt;table&gt; </a:t>
             </a:r>
           </a:p>
@@ -10821,8 +11340,40 @@
               <a:buNone/>
             </a:pPr>
             <a:r>
-              <a:rPr lang="es-ES" sz="2300"/>
-              <a:t>   &lt;ui:repeat var="o" value="#{order.orderList}" &gt;</a:t>
+              <a:rPr lang="es-ES" sz="2300" dirty="0"/>
+              <a:t>   &lt;</a:t>
+            </a:r>
+            <a:r>
+              <a:rPr lang="es-ES" sz="2300" dirty="0" err="1"/>
+              <a:t>ui:repeat</a:t>
+            </a:r>
+            <a:r>
+              <a:rPr lang="es-ES" sz="2300" dirty="0"/>
+              <a:t> </a:t>
+            </a:r>
+            <a:r>
+              <a:rPr lang="es-ES" sz="2300" dirty="0" err="1"/>
+              <a:t>var</a:t>
+            </a:r>
+            <a:r>
+              <a:rPr lang="es-ES" sz="2300" dirty="0"/>
+              <a:t>="o" </a:t>
+            </a:r>
+            <a:r>
+              <a:rPr lang="es-ES" sz="2300" dirty="0" err="1"/>
+              <a:t>value</a:t>
+            </a:r>
+            <a:r>
+              <a:rPr lang="es-ES" sz="2300" dirty="0"/>
+              <a:t>="#{</a:t>
+            </a:r>
+            <a:r>
+              <a:rPr lang="es-ES" sz="2300" dirty="0" err="1"/>
+              <a:t>order.orderList</a:t>
+            </a:r>
+            <a:r>
+              <a:rPr lang="es-ES" sz="2300" dirty="0"/>
+              <a:t>}" &gt;</a:t>
             </a:r>
           </a:p>
           <a:p>
@@ -10834,8 +11385,16 @@
               <a:buNone/>
             </a:pPr>
             <a:r>
-              <a:rPr lang="es-ES" sz="2300"/>
-              <a:t> 	&lt;tr&gt;</a:t>
+              <a:rPr lang="es-ES" sz="2300" dirty="0"/>
+              <a:t> 	&lt;</a:t>
+            </a:r>
+            <a:r>
+              <a:rPr lang="es-ES" sz="2300" dirty="0" err="1"/>
+              <a:t>tr</a:t>
+            </a:r>
+            <a:r>
+              <a:rPr lang="es-ES" sz="2300" dirty="0"/>
+              <a:t>&gt;</a:t>
             </a:r>
           </a:p>
           <a:p>
@@ -10847,8 +11406,16 @@
               <a:buNone/>
             </a:pPr>
             <a:r>
-              <a:rPr lang="es-ES" sz="2300"/>
-              <a:t>		&lt;td&gt;#{o.propiedad1}&lt;/td&gt;</a:t>
+              <a:rPr lang="es-ES" sz="2300" dirty="0"/>
+              <a:t>		&lt;</a:t>
+            </a:r>
+            <a:r>
+              <a:rPr lang="es-ES" sz="2300" dirty="0" err="1"/>
+              <a:t>td</a:t>
+            </a:r>
+            <a:r>
+              <a:rPr lang="es-ES" sz="2300" dirty="0"/>
+              <a:t>&gt;#{o.propiedad1}&lt;/td&gt;</a:t>
             </a:r>
           </a:p>
           <a:p>
@@ -10860,8 +11427,16 @@
               <a:buNone/>
             </a:pPr>
             <a:r>
-              <a:rPr lang="es-ES" sz="2300"/>
-              <a:t>		&lt;td&gt;#{o.propiedad2}&lt;/td&gt;</a:t>
+              <a:rPr lang="es-ES" sz="2300" dirty="0"/>
+              <a:t>		&lt;</a:t>
+            </a:r>
+            <a:r>
+              <a:rPr lang="es-ES" sz="2300" dirty="0" err="1"/>
+              <a:t>td</a:t>
+            </a:r>
+            <a:r>
+              <a:rPr lang="es-ES" sz="2300" dirty="0"/>
+              <a:t>&gt;#{o.propiedad2}&lt;/td&gt;</a:t>
             </a:r>
           </a:p>
           <a:p>
@@ -10873,8 +11448,16 @@
               <a:buNone/>
             </a:pPr>
             <a:r>
-              <a:rPr lang="es-ES" sz="2300"/>
-              <a:t>		&lt;td&gt;#{o.propiedad3}&lt;/td&gt;</a:t>
+              <a:rPr lang="es-ES" sz="2300" dirty="0"/>
+              <a:t>		&lt;</a:t>
+            </a:r>
+            <a:r>
+              <a:rPr lang="es-ES" sz="2300" dirty="0" err="1"/>
+              <a:t>td</a:t>
+            </a:r>
+            <a:r>
+              <a:rPr lang="es-ES" sz="2300" dirty="0"/>
+              <a:t>&gt;#{o.propiedad3}&lt;/td&gt;</a:t>
             </a:r>
           </a:p>
           <a:p>
@@ -10886,8 +11469,16 @@
               <a:buNone/>
             </a:pPr>
             <a:r>
-              <a:rPr lang="es-ES" sz="2300"/>
-              <a:t>		&lt;td&gt;#{o.propiedad4}&lt;/td&gt;</a:t>
+              <a:rPr lang="es-ES" sz="2300" dirty="0"/>
+              <a:t>		&lt;</a:t>
+            </a:r>
+            <a:r>
+              <a:rPr lang="es-ES" sz="2300" dirty="0" err="1"/>
+              <a:t>td</a:t>
+            </a:r>
+            <a:r>
+              <a:rPr lang="es-ES" sz="2300" dirty="0"/>
+              <a:t>&gt;#{o.propiedad4}&lt;/td&gt;</a:t>
             </a:r>
           </a:p>
           <a:p>
@@ -10899,8 +11490,16 @@
               <a:buNone/>
             </a:pPr>
             <a:r>
-              <a:rPr lang="es-ES" sz="2300"/>
-              <a:t>	&lt;/tr&gt; </a:t>
+              <a:rPr lang="es-ES" sz="2300" dirty="0"/>
+              <a:t>	&lt;/</a:t>
+            </a:r>
+            <a:r>
+              <a:rPr lang="es-ES" sz="2300" dirty="0" err="1"/>
+              <a:t>tr</a:t>
+            </a:r>
+            <a:r>
+              <a:rPr lang="es-ES" sz="2300" dirty="0"/>
+              <a:t>&gt; </a:t>
             </a:r>
           </a:p>
           <a:p>
@@ -10912,8 +11511,16 @@
               <a:buNone/>
             </a:pPr>
             <a:r>
-              <a:rPr lang="es-ES" sz="2300"/>
-              <a:t>   &lt;/ui:repeat&gt;</a:t>
+              <a:rPr lang="es-ES" sz="2300" dirty="0"/>
+              <a:t>   &lt;/</a:t>
+            </a:r>
+            <a:r>
+              <a:rPr lang="es-ES" sz="2300" dirty="0" err="1"/>
+              <a:t>ui:repeat</a:t>
+            </a:r>
+            <a:r>
+              <a:rPr lang="es-ES" sz="2300" dirty="0"/>
+              <a:t>&gt;</a:t>
             </a:r>
           </a:p>
           <a:p>
@@ -10925,7 +11532,7 @@
               <a:buNone/>
             </a:pPr>
             <a:r>
-              <a:rPr lang="es-ES" sz="2300"/>
+              <a:rPr lang="es-ES" sz="2300" dirty="0"/>
               <a:t> &lt;/table&gt;</a:t>
             </a:r>
           </a:p>
@@ -11424,34 +12031,87 @@
           <a:p>
             <a:pPr eaLnBrk="1" hangingPunct="1"/>
             <a:r>
-              <a:rPr lang="es-ES" b="1"/>
-              <a:t>Core: Converters</a:t>
-            </a:r>
+              <a:rPr lang="es-ES" b="1" dirty="0"/>
+              <a:t>Core: </a:t>
+            </a:r>
+            <a:r>
+              <a:rPr lang="es-ES" b="1" dirty="0" err="1"/>
+              <a:t>Converters</a:t>
+            </a:r>
+            <a:endParaRPr lang="es-ES" b="1" dirty="0"/>
           </a:p>
           <a:p>
             <a:pPr lvl="1" eaLnBrk="1" hangingPunct="1"/>
             <a:r>
-              <a:rPr lang="es-ES"/>
-              <a:t>&lt;f:converter/&gt;: Añade un Converter a un componente.</a:t>
+              <a:rPr lang="es-ES" dirty="0"/>
+              <a:t>&lt;</a:t>
+            </a:r>
+            <a:r>
+              <a:rPr lang="es-ES" dirty="0" err="1"/>
+              <a:t>f:converter</a:t>
+            </a:r>
+            <a:r>
+              <a:rPr lang="es-ES" dirty="0"/>
+              <a:t>/&gt;: Añade un </a:t>
+            </a:r>
+            <a:r>
+              <a:rPr lang="es-ES" dirty="0" err="1"/>
+              <a:t>Converter</a:t>
+            </a:r>
+            <a:r>
+              <a:rPr lang="es-ES" dirty="0"/>
+              <a:t> a un componente.</a:t>
             </a:r>
           </a:p>
           <a:p>
             <a:pPr lvl="1" eaLnBrk="1" hangingPunct="1"/>
             <a:r>
-              <a:rPr lang="es-ES"/>
-              <a:t>&lt;f:convertDateTime/&gt;: Añade un DateTimeConverter a un componente.</a:t>
+              <a:rPr lang="es-ES" dirty="0"/>
+              <a:t>&lt;</a:t>
+            </a:r>
+            <a:r>
+              <a:rPr lang="es-ES" dirty="0" err="1"/>
+              <a:t>f:convertDateTime</a:t>
+            </a:r>
+            <a:r>
+              <a:rPr lang="es-ES" dirty="0"/>
+              <a:t>/&gt;: Añade un </a:t>
+            </a:r>
+            <a:r>
+              <a:rPr lang="es-ES" dirty="0" err="1"/>
+              <a:t>DateTimeConverter</a:t>
+            </a:r>
+            <a:r>
+              <a:rPr lang="es-ES" dirty="0"/>
+              <a:t> a un componente.</a:t>
             </a:r>
           </a:p>
           <a:p>
             <a:pPr lvl="1" eaLnBrk="1" hangingPunct="1"/>
             <a:r>
-              <a:rPr lang="es-ES"/>
-              <a:t>&lt;f:convertNumber/&gt;: Añade un NumberConverter a un componente.</a:t>
+              <a:rPr lang="es-ES" dirty="0"/>
+              <a:t>&lt;</a:t>
+            </a:r>
+            <a:r>
+              <a:rPr lang="es-ES" dirty="0" err="1"/>
+              <a:t>f:convertNumber</a:t>
+            </a:r>
+            <a:r>
+              <a:rPr lang="es-ES" dirty="0"/>
+              <a:t>/&gt;: Añade un </a:t>
+            </a:r>
+            <a:r>
+              <a:rPr lang="es-ES" dirty="0" err="1"/>
+              <a:t>NumberConverter</a:t>
+            </a:r>
+            <a:r>
+              <a:rPr lang="es-ES" dirty="0"/>
+              <a:t> a un componente.</a:t>
             </a:r>
           </a:p>
           <a:p>
             <a:pPr eaLnBrk="1" hangingPunct="1"/>
-            <a:endParaRPr lang="es-ES"/>
+            <a:endParaRPr lang="es-ES" dirty="0"/>
           </a:p>
         </p:txBody>
       </p:sp>
@@ -11755,27 +12415,64 @@
           <a:p>
             <a:pPr eaLnBrk="1" hangingPunct="1"/>
             <a:r>
-              <a:rPr lang="es-ES" b="1"/>
-              <a:t>Core: Listeners</a:t>
-            </a:r>
+              <a:rPr lang="es-ES" b="1" dirty="0"/>
+              <a:t>Core: </a:t>
+            </a:r>
+            <a:r>
+              <a:rPr lang="es-ES" b="1" dirty="0" err="1"/>
+              <a:t>Listeners</a:t>
+            </a:r>
+            <a:endParaRPr lang="es-ES" b="1" dirty="0"/>
           </a:p>
           <a:p>
             <a:pPr lvl="1" eaLnBrk="1" hangingPunct="1"/>
             <a:r>
-              <a:rPr lang="es-ES"/>
-              <a:t>&lt;f:actionListener/&gt;: Añade un ActionListener a un componente.</a:t>
+              <a:rPr lang="es-ES" dirty="0"/>
+              <a:t>&lt;</a:t>
+            </a:r>
+            <a:r>
+              <a:rPr lang="es-ES" dirty="0" err="1"/>
+              <a:t>f:actionListener</a:t>
+            </a:r>
+            <a:r>
+              <a:rPr lang="es-ES" dirty="0"/>
+              <a:t>/&gt;: Añade un </a:t>
+            </a:r>
+            <a:r>
+              <a:rPr lang="es-ES" dirty="0" err="1"/>
+              <a:t>ActionListener</a:t>
+            </a:r>
+            <a:r>
+              <a:rPr lang="es-ES" dirty="0"/>
+              <a:t> a un componente.</a:t>
             </a:r>
           </a:p>
           <a:p>
             <a:pPr lvl="1" eaLnBrk="1" hangingPunct="1"/>
             <a:r>
-              <a:rPr lang="es-ES"/>
-              <a:t>&lt;f:valueChangeListener/&gt;: Añade un ValueChangeListener a un componente.</a:t>
+              <a:rPr lang="es-ES" dirty="0"/>
+              <a:t>&lt;</a:t>
+            </a:r>
+            <a:r>
+              <a:rPr lang="es-ES" dirty="0" err="1"/>
+              <a:t>f:valueChangeListener</a:t>
+            </a:r>
+            <a:r>
+              <a:rPr lang="es-ES" dirty="0"/>
+              <a:t>/&gt;: Añade un </a:t>
+            </a:r>
+            <a:r>
+              <a:rPr lang="es-ES" dirty="0" err="1"/>
+              <a:t>ValueChangeListener</a:t>
+            </a:r>
+            <a:r>
+              <a:rPr lang="es-ES" dirty="0"/>
+              <a:t> a un componente.</a:t>
             </a:r>
           </a:p>
           <a:p>
             <a:pPr eaLnBrk="1" hangingPunct="1"/>
-            <a:endParaRPr lang="es-ES"/>
+            <a:endParaRPr lang="es-ES" dirty="0"/>
           </a:p>
         </p:txBody>
       </p:sp>
@@ -12116,43 +12813,147 @@
           <a:p>
             <a:pPr eaLnBrk="1" hangingPunct="1"/>
             <a:r>
-              <a:rPr lang="es-ES" b="1"/>
+              <a:rPr lang="es-ES" b="1" dirty="0"/>
               <a:t>Core: Otros</a:t>
             </a:r>
           </a:p>
           <a:p>
             <a:pPr lvl="1" eaLnBrk="1" hangingPunct="1"/>
             <a:r>
-              <a:rPr lang="es-ES"/>
-              <a:t>&lt;f:attribute/&gt;: Añade un atributo (clave/valor) a un componente.</a:t>
+              <a:rPr lang="es-ES" dirty="0"/>
+              <a:t>&lt;</a:t>
+            </a:r>
+            <a:r>
+              <a:rPr lang="es-ES" dirty="0" err="1"/>
+              <a:t>f:attribute</a:t>
+            </a:r>
+            <a:r>
+              <a:rPr lang="es-ES" dirty="0"/>
+              <a:t>/&gt;: Añade un atributo (clave/valor) a un componente.</a:t>
             </a:r>
           </a:p>
           <a:p>
             <a:pPr lvl="1" eaLnBrk="1" hangingPunct="1"/>
             <a:r>
-              <a:rPr lang="es-ES"/>
-              <a:t>&lt;f:param/&gt;: Añade un parámetro a un componente.</a:t>
+              <a:rPr lang="es-ES" dirty="0"/>
+              <a:t>&lt;</a:t>
+            </a:r>
+            <a:r>
+              <a:rPr lang="es-ES" dirty="0" err="1"/>
+              <a:t>f:param</a:t>
+            </a:r>
+            <a:r>
+              <a:rPr lang="es-ES" dirty="0"/>
+              <a:t>/&gt;: Añade un parámetro a un componente.</a:t>
             </a:r>
           </a:p>
           <a:p>
             <a:pPr lvl="1" eaLnBrk="1" hangingPunct="1"/>
             <a:r>
-              <a:rPr lang="es-ES"/>
-              <a:t>&lt;f:loadBundle/&gt;: Carga un ResourceBundle y guarda las propiedades como un Map.</a:t>
+              <a:rPr lang="es-ES" dirty="0"/>
+              <a:t>&lt;</a:t>
+            </a:r>
+            <a:r>
+              <a:rPr lang="es-ES" dirty="0" err="1"/>
+              <a:t>f:loadBundle</a:t>
+            </a:r>
+            <a:r>
+              <a:rPr lang="es-ES" dirty="0"/>
+              <a:t>/&gt;: Carga un </a:t>
+            </a:r>
+            <a:r>
+              <a:rPr lang="es-ES" dirty="0" err="1"/>
+              <a:t>ResourceBundle</a:t>
+            </a:r>
+            <a:r>
+              <a:rPr lang="es-ES" dirty="0"/>
+              <a:t> y guarda las propiedades como un </a:t>
+            </a:r>
+            <a:r>
+              <a:rPr lang="es-ES" dirty="0" err="1"/>
+              <a:t>Map</a:t>
+            </a:r>
+            <a:r>
+              <a:rPr lang="es-ES" dirty="0"/>
+              <a:t>.</a:t>
             </a:r>
           </a:p>
           <a:p>
             <a:pPr lvl="1" eaLnBrk="1" hangingPunct="1"/>
             <a:r>
-              <a:rPr lang="es-ES"/>
-              <a:t>&lt;f:selectitems/&gt;: Specifica los items de un select.</a:t>
+              <a:rPr lang="es-ES" dirty="0"/>
+              <a:t>&lt;</a:t>
+            </a:r>
+            <a:r>
+              <a:rPr lang="es-ES" dirty="0" err="1"/>
+              <a:t>f:selectitems</a:t>
+            </a:r>
+            <a:r>
+              <a:rPr lang="es-ES" dirty="0"/>
+              <a:t>/&gt;: </a:t>
+            </a:r>
+            <a:r>
+              <a:rPr lang="es-ES" dirty="0" err="1"/>
+              <a:t>Specifica</a:t>
+            </a:r>
+            <a:r>
+              <a:rPr lang="es-ES" dirty="0"/>
+              <a:t> los </a:t>
+            </a:r>
+            <a:r>
+              <a:rPr lang="es-ES" dirty="0" err="1"/>
+              <a:t>items</a:t>
+            </a:r>
+            <a:r>
+              <a:rPr lang="es-ES" dirty="0"/>
+              <a:t> de un </a:t>
+            </a:r>
+            <a:r>
+              <a:rPr lang="es-ES" dirty="0" err="1"/>
+              <a:t>select</a:t>
+            </a:r>
+            <a:r>
+              <a:rPr lang="es-ES" dirty="0"/>
+              <a:t>.</a:t>
             </a:r>
           </a:p>
           <a:p>
             <a:pPr lvl="1" eaLnBrk="1" hangingPunct="1"/>
             <a:r>
-              <a:rPr lang="es-ES"/>
-              <a:t>&lt;f:selectitem/&gt;: Specifica un item de un select.</a:t>
+              <a:rPr lang="es-ES" dirty="0"/>
+              <a:t>&lt;</a:t>
+            </a:r>
+            <a:r>
+              <a:rPr lang="es-ES" dirty="0" err="1"/>
+              <a:t>f:selectitem</a:t>
+            </a:r>
+            <a:r>
+              <a:rPr lang="es-ES" dirty="0"/>
+              <a:t>/&gt;: </a:t>
+            </a:r>
+            <a:r>
+              <a:rPr lang="es-ES" dirty="0" err="1"/>
+              <a:t>Specifica</a:t>
+            </a:r>
+            <a:r>
+              <a:rPr lang="es-ES" dirty="0"/>
+              <a:t> un </a:t>
+            </a:r>
+            <a:r>
+              <a:rPr lang="es-ES" dirty="0" err="1"/>
+              <a:t>item</a:t>
+            </a:r>
+            <a:r>
+              <a:rPr lang="es-ES" dirty="0"/>
+              <a:t> de un </a:t>
+            </a:r>
+            <a:r>
+              <a:rPr lang="es-ES" dirty="0" err="1"/>
+              <a:t>select</a:t>
+            </a:r>
+            <a:r>
+              <a:rPr lang="es-ES" dirty="0"/>
+              <a:t>.</a:t>
             </a:r>
           </a:p>
           <a:p>
@@ -12160,7 +12961,7 @@
               <a:buFont typeface="Arial" charset="0"/>
               <a:buNone/>
             </a:pPr>
-            <a:endParaRPr lang="es-ES"/>
+            <a:endParaRPr lang="es-ES" dirty="0"/>
           </a:p>
         </p:txBody>
       </p:sp>
@@ -12447,43 +13248,83 @@
           <a:p>
             <a:pPr eaLnBrk="1" hangingPunct="1"/>
             <a:r>
-              <a:rPr lang="es-ES"/>
+              <a:rPr lang="es-ES" dirty="0"/>
               <a:t>Las librerías de etiquetas estándar son:</a:t>
             </a:r>
           </a:p>
           <a:p>
             <a:pPr lvl="1" eaLnBrk="1" hangingPunct="1"/>
             <a:r>
-              <a:rPr lang="es-ES"/>
+              <a:rPr lang="es-ES" dirty="0"/>
               <a:t>las</a:t>
             </a:r>
             <a:r>
-              <a:rPr lang="es-ES" b="1"/>
-              <a:t> core tags libraries</a:t>
-            </a:r>
-            <a:r>
-              <a:rPr lang="es-ES"/>
-              <a:t>: definen vistas, listeners, converters, validators, etc.</a:t>
+              <a:rPr lang="es-ES" b="1" dirty="0"/>
+              <a:t> </a:t>
+            </a:r>
+            <a:r>
+              <a:rPr lang="es-ES" b="1" dirty="0" err="1"/>
+              <a:t>core</a:t>
+            </a:r>
+            <a:r>
+              <a:rPr lang="es-ES" b="1" dirty="0"/>
+              <a:t> tags </a:t>
+            </a:r>
+            <a:r>
+              <a:rPr lang="es-ES" b="1" dirty="0" err="1"/>
+              <a:t>libraries</a:t>
+            </a:r>
+            <a:r>
+              <a:rPr lang="es-ES" dirty="0"/>
+              <a:t>: definen vistas, </a:t>
+            </a:r>
+            <a:r>
+              <a:rPr lang="es-ES" dirty="0" err="1"/>
+              <a:t>listeners</a:t>
+            </a:r>
+            <a:r>
+              <a:rPr lang="es-ES" dirty="0"/>
+              <a:t>, </a:t>
+            </a:r>
+            <a:r>
+              <a:rPr lang="es-ES" dirty="0" err="1"/>
+              <a:t>converters</a:t>
+            </a:r>
+            <a:r>
+              <a:rPr lang="es-ES" dirty="0"/>
+              <a:t>, </a:t>
+            </a:r>
+            <a:r>
+              <a:rPr lang="es-ES" dirty="0" err="1"/>
+              <a:t>validators</a:t>
+            </a:r>
+            <a:r>
+              <a:rPr lang="es-ES" dirty="0"/>
+              <a:t>, etc.</a:t>
             </a:r>
           </a:p>
           <a:p>
             <a:pPr lvl="1" eaLnBrk="1" hangingPunct="1"/>
             <a:r>
-              <a:rPr lang="es-ES"/>
+              <a:rPr lang="es-ES" dirty="0"/>
               <a:t>las</a:t>
             </a:r>
             <a:r>
-              <a:rPr lang="es-ES" b="1"/>
-              <a:t> html tags libraries</a:t>
-            </a:r>
-            <a:r>
-              <a:rPr lang="es-ES"/>
+              <a:rPr lang="es-ES" b="1" dirty="0"/>
+              <a:t> html tags </a:t>
+            </a:r>
+            <a:r>
+              <a:rPr lang="es-ES" b="1" dirty="0" err="1"/>
+              <a:t>libraries</a:t>
+            </a:r>
+            <a:r>
+              <a:rPr lang="es-ES" dirty="0"/>
               <a:t>: definen componentes de entrada, de salida, de acción, de selección, de agrupación</a:t>
             </a:r>
           </a:p>
           <a:p>
             <a:pPr eaLnBrk="1" hangingPunct="1"/>
-            <a:endParaRPr lang="es-ES"/>
+            <a:endParaRPr lang="es-ES" dirty="0"/>
           </a:p>
         </p:txBody>
       </p:sp>
@@ -12692,7 +13533,31 @@
             </a:r>
             <a:r>
               <a:rPr lang="es-ES" dirty="0"/>
-              <a:t>&gt; para que funcionen</a:t>
+              <a:t>&gt; para que funcionen. </a:t>
+            </a:r>
+            <a:r>
+              <a:rPr lang="es-ES" dirty="0" err="1"/>
+              <a:t>Sobretodo</a:t>
+            </a:r>
+            <a:r>
+              <a:rPr lang="es-ES" dirty="0"/>
+              <a:t> cuando queremos mandar información a los </a:t>
+            </a:r>
+            <a:r>
+              <a:rPr lang="es-ES" dirty="0" err="1"/>
+              <a:t>managed</a:t>
+            </a:r>
+            <a:r>
+              <a:rPr lang="es-ES" dirty="0"/>
+              <a:t> </a:t>
+            </a:r>
+            <a:r>
+              <a:rPr lang="es-ES" dirty="0" err="1"/>
+              <a:t>bean</a:t>
+            </a:r>
+            <a:r>
+              <a:rPr lang="es-ES" dirty="0"/>
+              <a:t>.</a:t>
             </a:r>
           </a:p>
           <a:p>
@@ -12816,36 +13681,68 @@
           <a:p>
             <a:pPr eaLnBrk="1" hangingPunct="1"/>
             <a:r>
-              <a:rPr lang="es-ES" b="1"/>
+              <a:rPr lang="es-ES" b="1" dirty="0"/>
               <a:t>HTML: Componentes de entrada</a:t>
             </a:r>
           </a:p>
           <a:p>
             <a:pPr lvl="1" eaLnBrk="1" hangingPunct="1"/>
             <a:r>
-              <a:rPr lang="es-ES"/>
-              <a:t>&lt;h:inputText/&gt;: Simple línea de texto de entrada.</a:t>
+              <a:rPr lang="es-ES" dirty="0"/>
+              <a:t>&lt;</a:t>
+            </a:r>
+            <a:r>
+              <a:rPr lang="es-ES" dirty="0" err="1"/>
+              <a:t>h:inputText</a:t>
+            </a:r>
+            <a:r>
+              <a:rPr lang="es-ES" dirty="0"/>
+              <a:t>/&gt;: Simple línea de texto de entrada.</a:t>
             </a:r>
           </a:p>
           <a:p>
             <a:pPr lvl="1" eaLnBrk="1" hangingPunct="1"/>
             <a:r>
-              <a:rPr lang="es-ES"/>
-              <a:t>&lt;h:inputTextarea/&gt;: Múltiples líneas de texto de entrada.</a:t>
+              <a:rPr lang="es-ES" dirty="0"/>
+              <a:t>&lt;</a:t>
+            </a:r>
+            <a:r>
+              <a:rPr lang="es-ES" dirty="0" err="1"/>
+              <a:t>h:inputTextarea</a:t>
+            </a:r>
+            <a:r>
+              <a:rPr lang="es-ES" dirty="0"/>
+              <a:t>/&gt;: Múltiples líneas de texto de entrada.</a:t>
             </a:r>
           </a:p>
           <a:p>
             <a:pPr lvl="1" eaLnBrk="1" hangingPunct="1"/>
             <a:r>
-              <a:rPr lang="es-ES"/>
-              <a:t>&lt;h:inputSecret/&gt;: Contraseña de entrada.</a:t>
+              <a:rPr lang="es-ES" dirty="0"/>
+              <a:t>&lt;</a:t>
+            </a:r>
+            <a:r>
+              <a:rPr lang="es-ES" dirty="0" err="1"/>
+              <a:t>h:inputSecret</a:t>
+            </a:r>
+            <a:r>
+              <a:rPr lang="es-ES" dirty="0"/>
+              <a:t>/&gt;: Contraseña de entrada.</a:t>
             </a:r>
           </a:p>
           <a:p>
             <a:pPr lvl="1" eaLnBrk="1" hangingPunct="1"/>
             <a:r>
-              <a:rPr lang="es-ES"/>
-              <a:t>&lt;h:inputHidden/&gt;: Campo oculto.</a:t>
+              <a:rPr lang="es-ES" dirty="0"/>
+              <a:t>&lt;</a:t>
+            </a:r>
+            <a:r>
+              <a:rPr lang="es-ES" dirty="0" err="1"/>
+              <a:t>h:inputHidden</a:t>
+            </a:r>
+            <a:r>
+              <a:rPr lang="es-ES" dirty="0"/>
+              <a:t>/&gt;: Campo oculto.</a:t>
             </a:r>
           </a:p>
         </p:txBody>
@@ -12981,76 +13878,172 @@
           <a:p>
             <a:pPr eaLnBrk="1" hangingPunct="1"/>
             <a:r>
-              <a:rPr lang="es-ES" b="1"/>
+              <a:rPr lang="es-ES" b="1" dirty="0"/>
               <a:t>HTML: Componentes de salida</a:t>
             </a:r>
           </a:p>
           <a:p>
             <a:pPr lvl="1" eaLnBrk="1" hangingPunct="1"/>
             <a:r>
-              <a:rPr lang="es-ES"/>
-              <a:t>&lt;h:outputLabel/&gt;: Etiqueta para otro componente.</a:t>
+              <a:rPr lang="es-ES" dirty="0"/>
+              <a:t>&lt;</a:t>
+            </a:r>
+            <a:r>
+              <a:rPr lang="es-ES" dirty="0" err="1"/>
+              <a:t>h:outputLabel</a:t>
+            </a:r>
+            <a:r>
+              <a:rPr lang="es-ES" dirty="0"/>
+              <a:t>/&gt;: Etiqueta para otro componente.</a:t>
             </a:r>
           </a:p>
           <a:p>
             <a:pPr lvl="1" eaLnBrk="1" hangingPunct="1"/>
             <a:r>
-              <a:rPr lang="es-ES"/>
-              <a:t>&lt;h:outputLink/&gt;: Enlace HTML.</a:t>
+              <a:rPr lang="es-ES" dirty="0"/>
+              <a:t>&lt;</a:t>
+            </a:r>
+            <a:r>
+              <a:rPr lang="es-ES" dirty="0" err="1"/>
+              <a:t>h:outputLink</a:t>
+            </a:r>
+            <a:r>
+              <a:rPr lang="es-ES" dirty="0"/>
+              <a:t>/&gt;: Enlace HTML.</a:t>
             </a:r>
           </a:p>
           <a:p>
             <a:pPr lvl="1" eaLnBrk="1" hangingPunct="1"/>
             <a:r>
-              <a:rPr lang="es-ES"/>
-              <a:t>&lt;h:outputFormat/&gt;: Formatea un texto de salida.</a:t>
+              <a:rPr lang="es-ES" dirty="0"/>
+              <a:t>&lt;</a:t>
+            </a:r>
+            <a:r>
+              <a:rPr lang="es-ES" dirty="0" err="1"/>
+              <a:t>h:outputFormat</a:t>
+            </a:r>
+            <a:r>
+              <a:rPr lang="es-ES" dirty="0"/>
+              <a:t>/&gt;: Formatea un texto de salida.</a:t>
             </a:r>
           </a:p>
           <a:p>
             <a:pPr lvl="1" eaLnBrk="1" hangingPunct="1"/>
             <a:r>
-              <a:rPr lang="es-ES"/>
-              <a:t>&lt;h:outputText/&gt;: Simple línea de texto de salida.</a:t>
+              <a:rPr lang="es-ES" dirty="0"/>
+              <a:t>&lt;</a:t>
+            </a:r>
+            <a:r>
+              <a:rPr lang="es-ES" dirty="0" err="1"/>
+              <a:t>h:outputText</a:t>
+            </a:r>
+            <a:r>
+              <a:rPr lang="es-ES" dirty="0"/>
+              <a:t>/&gt;: Simple línea de texto de salida.</a:t>
             </a:r>
           </a:p>
           <a:p>
             <a:pPr lvl="1" eaLnBrk="1" hangingPunct="1"/>
             <a:r>
-              <a:rPr lang="es-ES"/>
-              <a:t>&lt;h:outputStylesheet/&gt;: Import de un CSS.</a:t>
+              <a:rPr lang="es-ES" dirty="0"/>
+              <a:t>&lt;</a:t>
+            </a:r>
+            <a:r>
+              <a:rPr lang="es-ES" dirty="0" err="1"/>
+              <a:t>h:outputStylesheet</a:t>
+            </a:r>
+            <a:r>
+              <a:rPr lang="es-ES" dirty="0"/>
+              <a:t>/&gt;: </a:t>
+            </a:r>
+            <a:r>
+              <a:rPr lang="es-ES" dirty="0" err="1"/>
+              <a:t>Import</a:t>
+            </a:r>
+            <a:r>
+              <a:rPr lang="es-ES" dirty="0"/>
+              <a:t> de un CSS.</a:t>
             </a:r>
           </a:p>
           <a:p>
             <a:pPr lvl="1" eaLnBrk="1" hangingPunct="1"/>
             <a:r>
-              <a:rPr lang="es-ES"/>
-              <a:t>&lt;h:outputScript/&gt;: Import de un JavaSript.</a:t>
+              <a:rPr lang="es-ES" dirty="0"/>
+              <a:t>&lt;</a:t>
+            </a:r>
+            <a:r>
+              <a:rPr lang="es-ES" dirty="0" err="1"/>
+              <a:t>h:outputScript</a:t>
+            </a:r>
+            <a:r>
+              <a:rPr lang="es-ES" dirty="0"/>
+              <a:t>/&gt;: </a:t>
+            </a:r>
+            <a:r>
+              <a:rPr lang="es-ES" dirty="0" err="1"/>
+              <a:t>Import</a:t>
+            </a:r>
+            <a:r>
+              <a:rPr lang="es-ES" dirty="0"/>
+              <a:t> de un </a:t>
+            </a:r>
+            <a:r>
+              <a:rPr lang="es-ES" dirty="0" err="1"/>
+              <a:t>JavaSript</a:t>
+            </a:r>
+            <a:r>
+              <a:rPr lang="es-ES" dirty="0"/>
+              <a:t>.</a:t>
             </a:r>
           </a:p>
           <a:p>
             <a:pPr lvl="1" eaLnBrk="1" hangingPunct="1"/>
             <a:r>
-              <a:rPr lang="es-ES"/>
-              <a:t>&lt;h:graphicImage/&gt;: Muestra una imagen.</a:t>
+              <a:rPr lang="es-ES" dirty="0"/>
+              <a:t>&lt;</a:t>
+            </a:r>
+            <a:r>
+              <a:rPr lang="es-ES" dirty="0" err="1"/>
+              <a:t>h:graphicImage</a:t>
+            </a:r>
+            <a:r>
+              <a:rPr lang="es-ES" dirty="0"/>
+              <a:t>/&gt;: Muestra una imagen.</a:t>
             </a:r>
           </a:p>
           <a:p>
             <a:pPr lvl="1" eaLnBrk="1" hangingPunct="1"/>
             <a:r>
-              <a:rPr lang="es-ES"/>
-              <a:t>&lt;h:message/&gt;: Muestra un mensaje para un componente.</a:t>
+              <a:rPr lang="es-ES" dirty="0"/>
+              <a:t>&lt;</a:t>
+            </a:r>
+            <a:r>
+              <a:rPr lang="es-ES" dirty="0" err="1"/>
+              <a:t>h:message</a:t>
+            </a:r>
+            <a:r>
+              <a:rPr lang="es-ES" dirty="0"/>
+              <a:t>/&gt;: Muestra un mensaje para un componente.</a:t>
             </a:r>
           </a:p>
           <a:p>
             <a:pPr lvl="1" eaLnBrk="1" hangingPunct="1"/>
             <a:r>
-              <a:rPr lang="es-ES"/>
-              <a:t>&lt;h:messages/&gt;: Muestra todos los mensajes.</a:t>
+              <a:rPr lang="es-ES" dirty="0"/>
+              <a:t>&lt;</a:t>
+            </a:r>
+            <a:r>
+              <a:rPr lang="es-ES" dirty="0" err="1"/>
+              <a:t>h:messages</a:t>
+            </a:r>
+            <a:r>
+              <a:rPr lang="es-ES" dirty="0"/>
+              <a:t>/&gt;: Muestra todos los mensajes.</a:t>
             </a:r>
           </a:p>
           <a:p>
             <a:pPr eaLnBrk="1" hangingPunct="1"/>
-            <a:endParaRPr lang="es-ES"/>
+            <a:endParaRPr lang="es-ES" dirty="0"/>
           </a:p>
         </p:txBody>
       </p:sp>
@@ -13228,15 +14221,7 @@
             </a:r>
             <a:r>
               <a:rPr lang="es-ES" sz="2100" dirty="0"/>
-              <a:t>="#{</a:t>
-            </a:r>
-            <a:r>
-              <a:rPr lang="es-ES" sz="2100" dirty="0" err="1"/>
-              <a:t>user.text</a:t>
-            </a:r>
-            <a:r>
-              <a:rPr lang="es-ES" sz="2100" dirty="0"/>
-              <a:t>}" /&gt;</a:t>
+              <a:t>="#{user.text}" /&gt;</a:t>
             </a:r>
           </a:p>
           <a:p>
@@ -13244,10 +14229,56 @@
               <a:spcBef>
                 <a:spcPts val="1263"/>
               </a:spcBef>
-              <a:buFont typeface="Arial" charset="0"/>
-              <a:buNone/>
-            </a:pPr>
-            <a:endParaRPr lang="es-ES" sz="2100" dirty="0"/>
+              <a:buNone/>
+            </a:pPr>
+            <a:r>
+              <a:rPr lang="es-ES" sz="2100" dirty="0"/>
+              <a:t>&lt;</a:t>
+            </a:r>
+            <a:r>
+              <a:rPr lang="es-ES" sz="2100" dirty="0" err="1"/>
+              <a:t>h:outputText</a:t>
+            </a:r>
+            <a:r>
+              <a:rPr lang="es-ES" sz="2100" dirty="0"/>
+              <a:t> </a:t>
+            </a:r>
+            <a:r>
+              <a:rPr lang="es-ES" sz="2100" dirty="0" err="1"/>
+              <a:t>value</a:t>
+            </a:r>
+            <a:r>
+              <a:rPr lang="es-ES" sz="2100" dirty="0"/>
+              <a:t>=“hola: #{user.text} soy #{user.text2}" /&gt;</a:t>
+            </a:r>
+          </a:p>
+          <a:p>
+            <a:pPr eaLnBrk="1" hangingPunct="1">
+              <a:spcBef>
+                <a:spcPts val="1263"/>
+              </a:spcBef>
+              <a:buNone/>
+            </a:pPr>
+            <a:r>
+              <a:rPr lang="es-ES" sz="2100" dirty="0"/>
+              <a:t>&lt;</a:t>
+            </a:r>
+            <a:r>
+              <a:rPr lang="es-ES" sz="2100" dirty="0" err="1"/>
+              <a:t>h:outputText</a:t>
+            </a:r>
+            <a:r>
+              <a:rPr lang="es-ES" sz="2100" dirty="0"/>
+              <a:t> </a:t>
+            </a:r>
+            <a:r>
+              <a:rPr lang="es-ES" sz="2100" dirty="0" err="1"/>
+              <a:t>value</a:t>
+            </a:r>
+            <a:r>
+              <a:rPr lang="es-ES" sz="2100" dirty="0"/>
+              <a:t>=“Hola esto es un texto fijo/&gt;</a:t>
+            </a:r>
           </a:p>
           <a:p>
             <a:pPr eaLnBrk="1" hangingPunct="1">
@@ -13353,7 +14384,15 @@
             </a:r>
             <a:r>
               <a:rPr lang="es-ES" sz="2300" dirty="0"/>
-              <a:t>="Numero 2" /&gt; </a:t>
+              <a:t>=“#{</a:t>
+            </a:r>
+            <a:r>
+              <a:rPr lang="es-ES" sz="2300" dirty="0" err="1"/>
+              <a:t>user.text</a:t>
+            </a:r>
+            <a:r>
+              <a:rPr lang="es-ES" sz="2300" dirty="0"/>
+              <a:t>}" /&gt; </a:t>
             </a:r>
           </a:p>
           <a:p>

</xml_diff>

<commit_message>
mejoras pdfs y codigo
</commit_message>
<xml_diff>
--- a/_18_JSF/powerpoint/JSF - 2 - Vistas.pptx
+++ b/_18_JSF/powerpoint/JSF - 2 - Vistas.pptx
@@ -513,7 +513,7 @@
               <a:pPr>
                 <a:defRPr/>
               </a:pPr>
-              <a:t>28/10/2022</a:t>
+              <a:t>31/10/2022</a:t>
             </a:fld>
             <a:endParaRPr lang="es-ES"/>
           </a:p>
@@ -703,7 +703,7 @@
               <a:pPr>
                 <a:defRPr/>
               </a:pPr>
-              <a:t>28/10/2022</a:t>
+              <a:t>31/10/2022</a:t>
             </a:fld>
             <a:endParaRPr lang="es-ES"/>
           </a:p>
@@ -903,7 +903,7 @@
               <a:pPr>
                 <a:defRPr/>
               </a:pPr>
-              <a:t>28/10/2022</a:t>
+              <a:t>31/10/2022</a:t>
             </a:fld>
             <a:endParaRPr lang="es-ES"/>
           </a:p>
@@ -3450,7 +3450,7 @@
               <a:pPr>
                 <a:defRPr/>
               </a:pPr>
-              <a:t>28/10/2022</a:t>
+              <a:t>31/10/2022</a:t>
             </a:fld>
             <a:endParaRPr lang="es-ES"/>
           </a:p>
@@ -4454,7 +4454,7 @@
               <a:pPr>
                 <a:defRPr/>
               </a:pPr>
-              <a:t>28/10/2022</a:t>
+              <a:t>31/10/2022</a:t>
             </a:fld>
             <a:endParaRPr lang="es-ES"/>
           </a:p>
@@ -4761,7 +4761,7 @@
               <a:pPr>
                 <a:defRPr/>
               </a:pPr>
-              <a:t>28/10/2022</a:t>
+              <a:t>31/10/2022</a:t>
             </a:fld>
             <a:endParaRPr lang="es-ES"/>
           </a:p>
@@ -5202,7 +5202,7 @@
               <a:pPr>
                 <a:defRPr/>
               </a:pPr>
-              <a:t>28/10/2022</a:t>
+              <a:t>31/10/2022</a:t>
             </a:fld>
             <a:endParaRPr lang="es-ES"/>
           </a:p>
@@ -5341,7 +5341,7 @@
               <a:pPr>
                 <a:defRPr/>
               </a:pPr>
-              <a:t>28/10/2022</a:t>
+              <a:t>31/10/2022</a:t>
             </a:fld>
             <a:endParaRPr lang="es-ES"/>
           </a:p>
@@ -5458,7 +5458,7 @@
               <a:pPr>
                 <a:defRPr/>
               </a:pPr>
-              <a:t>28/10/2022</a:t>
+              <a:t>31/10/2022</a:t>
             </a:fld>
             <a:endParaRPr lang="es-ES"/>
           </a:p>
@@ -5755,7 +5755,7 @@
               <a:pPr>
                 <a:defRPr/>
               </a:pPr>
-              <a:t>28/10/2022</a:t>
+              <a:t>31/10/2022</a:t>
             </a:fld>
             <a:endParaRPr lang="es-ES"/>
           </a:p>
@@ -6032,7 +6032,7 @@
               <a:pPr>
                 <a:defRPr/>
               </a:pPr>
-              <a:t>28/10/2022</a:t>
+              <a:t>31/10/2022</a:t>
             </a:fld>
             <a:endParaRPr lang="es-ES"/>
           </a:p>
@@ -6288,7 +6288,7 @@
               <a:pPr>
                 <a:defRPr/>
               </a:pPr>
-              <a:t>28/10/2022</a:t>
+              <a:t>31/10/2022</a:t>
             </a:fld>
             <a:endParaRPr lang="es-ES"/>
           </a:p>
@@ -7076,7 +7076,7 @@
               <a:pPr>
                 <a:defRPr/>
               </a:pPr>
-              <a:t>28/10/2022</a:t>
+              <a:t>31/10/2022</a:t>
             </a:fld>
             <a:endParaRPr lang="es-ES"/>
           </a:p>
@@ -8393,6 +8393,21 @@
             <a:pPr eaLnBrk="1" hangingPunct="1"/>
             <a:endParaRPr lang="es-ES" dirty="0"/>
           </a:p>
+          <a:p>
+            <a:pPr eaLnBrk="1" hangingPunct="1"/>
+            <a:r>
+              <a:rPr lang="es-ES" dirty="0"/>
+              <a:t>OJO! Para usar estos componentes debemos de ponerlos dentro de un &lt;</a:t>
+            </a:r>
+            <a:r>
+              <a:rPr lang="es-ES" dirty="0" err="1"/>
+              <a:t>h:form</a:t>
+            </a:r>
+            <a:r>
+              <a:rPr lang="es-ES" dirty="0"/>
+              <a:t>&gt;, aunque no mandemos información.</a:t>
+            </a:r>
+          </a:p>
         </p:txBody>
       </p:sp>
       <p:sp>
@@ -11819,8 +11834,24 @@
               <a:buNone/>
             </a:pPr>
             <a:r>
-              <a:rPr lang="es-ES" sz="2300"/>
-              <a:t>&lt;h:panelGrid columns="3"&gt; </a:t>
+              <a:rPr lang="es-ES" sz="2300" dirty="0"/>
+              <a:t>&lt;</a:t>
+            </a:r>
+            <a:r>
+              <a:rPr lang="es-ES" sz="2300" dirty="0" err="1"/>
+              <a:t>h:panelGrid</a:t>
+            </a:r>
+            <a:r>
+              <a:rPr lang="es-ES" sz="2300" dirty="0"/>
+              <a:t> </a:t>
+            </a:r>
+            <a:r>
+              <a:rPr lang="es-ES" sz="2300" dirty="0" err="1"/>
+              <a:t>columns</a:t>
+            </a:r>
+            <a:r>
+              <a:rPr lang="es-ES" sz="2300" dirty="0"/>
+              <a:t>="3"&gt; </a:t>
             </a:r>
           </a:p>
           <a:p>
@@ -11832,8 +11863,40 @@
               <a:buNone/>
             </a:pPr>
             <a:r>
-              <a:rPr lang="es-ES" sz="2300"/>
-              <a:t>		Enter a number : </a:t>
+              <a:rPr lang="es-ES" sz="2300" dirty="0"/>
+              <a:t>		&lt;</a:t>
+            </a:r>
+            <a:r>
+              <a:rPr lang="es-ES" sz="2300" dirty="0" err="1"/>
+              <a:t>h:outputText</a:t>
+            </a:r>
+            <a:r>
+              <a:rPr lang="es-ES" sz="2300" dirty="0"/>
+              <a:t> </a:t>
+            </a:r>
+            <a:r>
+              <a:rPr lang="es-ES" sz="2300" dirty="0" err="1"/>
+              <a:t>value</a:t>
+            </a:r>
+            <a:r>
+              <a:rPr lang="es-ES" sz="2300" dirty="0"/>
+              <a:t>=“</a:t>
+            </a:r>
+            <a:r>
+              <a:rPr lang="es-ES" sz="2300" dirty="0" err="1"/>
+              <a:t>Enter</a:t>
+            </a:r>
+            <a:r>
+              <a:rPr lang="es-ES" sz="2300" dirty="0"/>
+              <a:t> a </a:t>
+            </a:r>
+            <a:r>
+              <a:rPr lang="es-ES" sz="2300" dirty="0" err="1"/>
+              <a:t>number</a:t>
+            </a:r>
+            <a:r>
+              <a:rPr lang="es-ES" sz="2300" dirty="0"/>
+              <a:t> :”/&gt; </a:t>
             </a:r>
           </a:p>
           <a:p>
@@ -11845,8 +11908,32 @@
               <a:buNone/>
             </a:pPr>
             <a:r>
-              <a:rPr lang="es-ES" sz="2300"/>
-              <a:t>	 	&lt;h:inputText id="numero" value="#{bean.numero}" </a:t>
+              <a:rPr lang="es-ES" sz="2300" dirty="0"/>
+              <a:t>	 	&lt;</a:t>
+            </a:r>
+            <a:r>
+              <a:rPr lang="es-ES" sz="2300" dirty="0" err="1"/>
+              <a:t>h:inputText</a:t>
+            </a:r>
+            <a:r>
+              <a:rPr lang="es-ES" sz="2300" dirty="0"/>
+              <a:t> id="numero" </a:t>
+            </a:r>
+            <a:r>
+              <a:rPr lang="es-ES" sz="2300" dirty="0" err="1"/>
+              <a:t>value</a:t>
+            </a:r>
+            <a:r>
+              <a:rPr lang="es-ES" sz="2300" dirty="0"/>
+              <a:t>="#{</a:t>
+            </a:r>
+            <a:r>
+              <a:rPr lang="es-ES" sz="2300" dirty="0" err="1"/>
+              <a:t>bean.numero</a:t>
+            </a:r>
+            <a:r>
+              <a:rPr lang="es-ES" sz="2300" dirty="0"/>
+              <a:t>}" </a:t>
             </a:r>
           </a:p>
           <a:p>
@@ -11858,8 +11945,24 @@
               <a:buNone/>
             </a:pPr>
             <a:r>
-              <a:rPr lang="es-ES" sz="2300"/>
-              <a:t>			size="20" required="true"</a:t>
+              <a:rPr lang="es-ES" sz="2300" dirty="0"/>
+              <a:t>			</a:t>
+            </a:r>
+            <a:r>
+              <a:rPr lang="es-ES" sz="2300" dirty="0" err="1"/>
+              <a:t>size</a:t>
+            </a:r>
+            <a:r>
+              <a:rPr lang="es-ES" sz="2300" dirty="0"/>
+              <a:t>="20" </a:t>
+            </a:r>
+            <a:r>
+              <a:rPr lang="es-ES" sz="2300" dirty="0" err="1"/>
+              <a:t>required</a:t>
+            </a:r>
+            <a:r>
+              <a:rPr lang="es-ES" sz="2300" dirty="0"/>
+              <a:t>="true"</a:t>
             </a:r>
           </a:p>
           <a:p>
@@ -11871,8 +11974,16 @@
               <a:buNone/>
             </a:pPr>
             <a:r>
-              <a:rPr lang="es-ES" sz="2300"/>
-              <a:t>			label="Numero" &gt;</a:t>
+              <a:rPr lang="es-ES" sz="2300" dirty="0"/>
+              <a:t>			</a:t>
+            </a:r>
+            <a:r>
+              <a:rPr lang="es-ES" sz="2300" dirty="0" err="1"/>
+              <a:t>label</a:t>
+            </a:r>
+            <a:r>
+              <a:rPr lang="es-ES" sz="2300" dirty="0"/>
+              <a:t>="Numero" &gt;</a:t>
             </a:r>
           </a:p>
           <a:p>
@@ -11884,8 +11995,16 @@
               <a:buNone/>
             </a:pPr>
             <a:r>
-              <a:rPr lang="es-ES" sz="2300"/>
-              <a:t>		&lt;/h:inputText&gt;</a:t>
+              <a:rPr lang="es-ES" sz="2300" dirty="0"/>
+              <a:t>		&lt;/</a:t>
+            </a:r>
+            <a:r>
+              <a:rPr lang="es-ES" sz="2300" dirty="0" err="1"/>
+              <a:t>h:inputText</a:t>
+            </a:r>
+            <a:r>
+              <a:rPr lang="es-ES" sz="2300" dirty="0"/>
+              <a:t>&gt;</a:t>
             </a:r>
           </a:p>
           <a:p>
@@ -11897,8 +12016,40 @@
               <a:buNone/>
             </a:pPr>
             <a:r>
-              <a:rPr lang="es-ES" sz="2300"/>
-              <a:t>		&lt;h:message for="numero" style="color:red" /&gt;</a:t>
+              <a:rPr lang="es-ES" sz="2300" dirty="0"/>
+              <a:t>		&lt;</a:t>
+            </a:r>
+            <a:r>
+              <a:rPr lang="es-ES" sz="2300" dirty="0" err="1"/>
+              <a:t>h:message</a:t>
+            </a:r>
+            <a:r>
+              <a:rPr lang="es-ES" sz="2300" dirty="0"/>
+              <a:t> </a:t>
+            </a:r>
+            <a:r>
+              <a:rPr lang="es-ES" sz="2300" dirty="0" err="1"/>
+              <a:t>for</a:t>
+            </a:r>
+            <a:r>
+              <a:rPr lang="es-ES" sz="2300" dirty="0"/>
+              <a:t>="numero" </a:t>
+            </a:r>
+            <a:r>
+              <a:rPr lang="es-ES" sz="2300" dirty="0" err="1"/>
+              <a:t>style</a:t>
+            </a:r>
+            <a:r>
+              <a:rPr lang="es-ES" sz="2300" dirty="0"/>
+              <a:t>="</a:t>
+            </a:r>
+            <a:r>
+              <a:rPr lang="es-ES" sz="2300" dirty="0" err="1"/>
+              <a:t>color:red</a:t>
+            </a:r>
+            <a:r>
+              <a:rPr lang="es-ES" sz="2300" dirty="0"/>
+              <a:t>" /&gt;</a:t>
             </a:r>
           </a:p>
           <a:p>
@@ -11910,8 +12061,16 @@
               <a:buNone/>
             </a:pPr>
             <a:r>
-              <a:rPr lang="es-ES" sz="2300"/>
-              <a:t>&lt;/h:panelGrid&gt;</a:t>
+              <a:rPr lang="es-ES" sz="2300" dirty="0"/>
+              <a:t>&lt;/</a:t>
+            </a:r>
+            <a:r>
+              <a:rPr lang="es-ES" sz="2300" dirty="0" err="1"/>
+              <a:t>h:panelGrid</a:t>
+            </a:r>
+            <a:r>
+              <a:rPr lang="es-ES" sz="2300" dirty="0"/>
+              <a:t>&gt;</a:t>
             </a:r>
           </a:p>
         </p:txBody>
@@ -14155,7 +14314,12 @@
             <p:ph idx="1"/>
           </p:nvPr>
         </p:nvSpPr>
-        <p:spPr/>
+        <p:spPr>
+          <a:xfrm>
+            <a:off x="611560" y="1526732"/>
+            <a:ext cx="8229600" cy="4876800"/>
+          </a:xfrm>
+        </p:spPr>
         <p:txBody>
           <a:bodyPr/>
           <a:lstStyle/>

</xml_diff>